<commit_message>
added points in ppt
</commit_message>
<xml_diff>
--- a/Sales Forcating.pptx
+++ b/Sales Forcating.pptx
@@ -2,12 +2,16 @@
 <file path=ppt/presentation.xml><?xml version="1.0" encoding="utf-8"?>
 <p:presentation xmlns:a="http://schemas.openxmlformats.org/drawingml/2006/main" xmlns:r="http://schemas.openxmlformats.org/officeDocument/2006/relationships" xmlns:p="http://schemas.openxmlformats.org/presentationml/2006/main" saveSubsetFonts="1">
   <p:sldMasterIdLst>
-    <p:sldMasterId id="2147483660" r:id="rId1"/>
+    <p:sldMasterId id="2147483677" r:id="rId1"/>
   </p:sldMasterIdLst>
   <p:sldIdLst>
     <p:sldId id="256" r:id="rId2"/>
     <p:sldId id="258" r:id="rId3"/>
-    <p:sldId id="257" r:id="rId4"/>
+    <p:sldId id="259" r:id="rId4"/>
+    <p:sldId id="260" r:id="rId5"/>
+    <p:sldId id="261" r:id="rId6"/>
+    <p:sldId id="262" r:id="rId7"/>
+    <p:sldId id="257" r:id="rId8"/>
   </p:sldIdLst>
   <p:sldSz cx="12192000" cy="6858000"/>
   <p:notesSz cx="6858000" cy="9144000"/>
@@ -106,6 +110,11 @@
       </a:defRPr>
     </a:lvl9pPr>
   </p:defaultTextStyle>
+  <p:extLst>
+    <p:ext uri="{EFAFB233-063F-42B5-8137-9DF3F51BA10A}">
+      <p15:sldGuideLst xmlns:p15="http://schemas.microsoft.com/office/powerpoint/2012/main"/>
+    </p:ext>
+  </p:extLst>
 </p:presentation>
 </file>
 
@@ -128,7 +137,7 @@
       </p:grpSpPr>
       <p:grpSp>
         <p:nvGrpSpPr>
-          <p:cNvPr id="7" name="Group 6"/>
+          <p:cNvPr id="16" name="Group 15"/>
           <p:cNvGrpSpPr/>
           <p:nvPr/>
         </p:nvGrpSpPr>
@@ -140,9 +149,72 @@
             <a:chExt cx="12192000" cy="6866467"/>
           </a:xfrm>
         </p:grpSpPr>
+        <p:sp>
+          <p:nvSpPr>
+            <p:cNvPr id="15" name="Freeform 14"/>
+            <p:cNvSpPr/>
+            <p:nvPr/>
+          </p:nvSpPr>
+          <p:spPr>
+            <a:xfrm>
+              <a:off x="0" y="-7862"/>
+              <a:ext cx="863600" cy="5698067"/>
+            </a:xfrm>
+            <a:custGeom>
+              <a:avLst/>
+              <a:gdLst/>
+              <a:ahLst/>
+              <a:cxnLst/>
+              <a:rect l="l" t="t" r="r" b="b"/>
+              <a:pathLst>
+                <a:path w="863600" h="5698067">
+                  <a:moveTo>
+                    <a:pt x="0" y="8467"/>
+                  </a:moveTo>
+                  <a:lnTo>
+                    <a:pt x="863600" y="0"/>
+                  </a:lnTo>
+                  <a:lnTo>
+                    <a:pt x="863600" y="16934"/>
+                  </a:lnTo>
+                  <a:lnTo>
+                    <a:pt x="0" y="5698067"/>
+                  </a:lnTo>
+                  <a:lnTo>
+                    <a:pt x="0" y="8467"/>
+                  </a:lnTo>
+                  <a:close/>
+                </a:path>
+              </a:pathLst>
+            </a:custGeom>
+            <a:solidFill>
+              <a:schemeClr val="accent1">
+                <a:alpha val="70000"/>
+              </a:schemeClr>
+            </a:solidFill>
+            <a:ln>
+              <a:noFill/>
+            </a:ln>
+            <a:effectLst/>
+          </p:spPr>
+          <p:style>
+            <a:lnRef idx="1">
+              <a:schemeClr val="accent1"/>
+            </a:lnRef>
+            <a:fillRef idx="3">
+              <a:schemeClr val="accent1"/>
+            </a:fillRef>
+            <a:effectRef idx="2">
+              <a:schemeClr val="accent1"/>
+            </a:effectRef>
+            <a:fontRef idx="minor">
+              <a:schemeClr val="lt1"/>
+            </a:fontRef>
+          </p:style>
+        </p:sp>
         <p:cxnSp>
           <p:nvCxnSpPr>
-            <p:cNvPr id="32" name="Straight Connector 31"/>
+            <p:cNvPr id="19" name="Straight Connector 18"/>
             <p:cNvCxnSpPr/>
             <p:nvPr/>
           </p:nvCxnSpPr>
@@ -156,8 +228,8 @@
             </a:prstGeom>
             <a:ln w="9525">
               <a:solidFill>
-                <a:schemeClr val="bg1">
-                  <a:lumMod val="75000"/>
+                <a:schemeClr val="accent1">
+                  <a:alpha val="70000"/>
                 </a:schemeClr>
               </a:solidFill>
             </a:ln>
@@ -179,7 +251,7 @@
         </p:cxnSp>
         <p:cxnSp>
           <p:nvCxnSpPr>
-            <p:cNvPr id="21" name="Straight Connector 20"/>
+            <p:cNvPr id="20" name="Straight Connector 19"/>
             <p:cNvCxnSpPr/>
             <p:nvPr/>
           </p:nvCxnSpPr>
@@ -193,8 +265,8 @@
             </a:prstGeom>
             <a:ln w="9525">
               <a:solidFill>
-                <a:schemeClr val="bg1">
-                  <a:lumMod val="85000"/>
+                <a:schemeClr val="accent1">
+                  <a:alpha val="70000"/>
                 </a:schemeClr>
               </a:solidFill>
             </a:ln>
@@ -216,7 +288,7 @@
         </p:cxnSp>
         <p:sp>
           <p:nvSpPr>
-            <p:cNvPr id="24" name="Rectangle 23"/>
+            <p:cNvPr id="21" name="Rectangle 23"/>
             <p:cNvSpPr/>
             <p:nvPr/>
           </p:nvSpPr>
@@ -254,7 +326,7 @@
             </a:custGeom>
             <a:solidFill>
               <a:schemeClr val="accent1">
-                <a:alpha val="30000"/>
+                <a:alpha val="36000"/>
               </a:schemeClr>
             </a:solidFill>
             <a:ln>
@@ -279,7 +351,7 @@
         </p:sp>
         <p:sp>
           <p:nvSpPr>
-            <p:cNvPr id="26" name="Rectangle 25"/>
+            <p:cNvPr id="22" name="Rectangle 25"/>
             <p:cNvSpPr/>
             <p:nvPr/>
           </p:nvSpPr>
@@ -342,7 +414,7 @@
         </p:sp>
         <p:sp>
           <p:nvSpPr>
-            <p:cNvPr id="27" name="Isosceles Triangle 26"/>
+            <p:cNvPr id="23" name="Isosceles Triangle 22"/>
             <p:cNvSpPr/>
             <p:nvPr/>
           </p:nvSpPr>
@@ -357,8 +429,9 @@
               </a:avLst>
             </a:prstGeom>
             <a:solidFill>
-              <a:schemeClr val="accent2">
-                <a:alpha val="72000"/>
+              <a:schemeClr val="accent1">
+                <a:lumMod val="75000"/>
+                <a:alpha val="66000"/>
               </a:schemeClr>
             </a:solidFill>
             <a:ln>
@@ -383,7 +456,7 @@
         </p:sp>
         <p:sp>
           <p:nvSpPr>
-            <p:cNvPr id="28" name="Rectangle 27"/>
+            <p:cNvPr id="24" name="Rectangle 27"/>
             <p:cNvSpPr/>
             <p:nvPr/>
           </p:nvSpPr>
@@ -420,9 +493,9 @@
               </a:pathLst>
             </a:custGeom>
             <a:solidFill>
-              <a:schemeClr val="accent2">
+              <a:schemeClr val="accent1">
                 <a:lumMod val="75000"/>
-                <a:alpha val="70000"/>
+                <a:alpha val="50000"/>
               </a:schemeClr>
             </a:solidFill>
             <a:ln>
@@ -447,7 +520,7 @@
         </p:sp>
         <p:sp>
           <p:nvSpPr>
-            <p:cNvPr id="29" name="Rectangle 28"/>
+            <p:cNvPr id="25" name="Rectangle 28"/>
             <p:cNvSpPr/>
             <p:nvPr/>
           </p:nvSpPr>
@@ -484,9 +557,7 @@
               </a:pathLst>
             </a:custGeom>
             <a:solidFill>
-              <a:schemeClr val="accent1">
-                <a:lumMod val="60000"/>
-                <a:lumOff val="40000"/>
+              <a:schemeClr val="accent2">
                 <a:alpha val="70000"/>
               </a:schemeClr>
             </a:solidFill>
@@ -512,7 +583,7 @@
         </p:sp>
         <p:sp>
           <p:nvSpPr>
-            <p:cNvPr id="30" name="Rectangle 29"/>
+            <p:cNvPr id="26" name="Rectangle 29"/>
             <p:cNvSpPr/>
             <p:nvPr/>
           </p:nvSpPr>
@@ -549,48 +620,8 @@
               </a:pathLst>
             </a:custGeom>
             <a:solidFill>
-              <a:schemeClr val="accent1">
-                <a:alpha val="65000"/>
-              </a:schemeClr>
-            </a:solidFill>
-            <a:ln>
-              <a:noFill/>
-            </a:ln>
-            <a:effectLst/>
-          </p:spPr>
-          <p:style>
-            <a:lnRef idx="1">
-              <a:schemeClr val="accent1"/>
-            </a:lnRef>
-            <a:fillRef idx="3">
-              <a:schemeClr val="accent1"/>
-            </a:fillRef>
-            <a:effectRef idx="2">
-              <a:schemeClr val="accent1"/>
-            </a:effectRef>
-            <a:fontRef idx="minor">
-              <a:schemeClr val="lt1"/>
-            </a:fontRef>
-          </p:style>
-        </p:sp>
-        <p:sp>
-          <p:nvSpPr>
-            <p:cNvPr id="31" name="Isosceles Triangle 30"/>
-            <p:cNvSpPr/>
-            <p:nvPr/>
-          </p:nvSpPr>
-          <p:spPr>
-            <a:xfrm>
-              <a:off x="10371666" y="3589867"/>
-              <a:ext cx="1817159" cy="3268133"/>
-            </a:xfrm>
-            <a:prstGeom prst="triangle">
-              <a:avLst>
-                <a:gd name="adj" fmla="val 100000"/>
-              </a:avLst>
-            </a:prstGeom>
-            <a:solidFill>
-              <a:schemeClr val="accent1">
+              <a:schemeClr val="accent2">
+                <a:lumMod val="75000"/>
                 <a:alpha val="80000"/>
               </a:schemeClr>
             </a:solidFill>
@@ -616,14 +647,14 @@
         </p:sp>
         <p:sp>
           <p:nvSpPr>
-            <p:cNvPr id="19" name="Isosceles Triangle 18"/>
+            <p:cNvPr id="27" name="Isosceles Triangle 26"/>
             <p:cNvSpPr/>
             <p:nvPr/>
           </p:nvSpPr>
           <p:spPr>
-            <a:xfrm rot="10800000">
-              <a:off x="0" y="0"/>
-              <a:ext cx="842596" cy="5666154"/>
+            <a:xfrm>
+              <a:off x="10371666" y="3589867"/>
+              <a:ext cx="1817159" cy="3268133"/>
             </a:xfrm>
             <a:prstGeom prst="triangle">
               <a:avLst>
@@ -632,7 +663,8 @@
             </a:prstGeom>
             <a:solidFill>
               <a:schemeClr val="accent1">
-                <a:alpha val="85000"/>
+                <a:lumMod val="75000"/>
+                <a:alpha val="66000"/>
               </a:schemeClr>
             </a:solidFill>
             <a:ln>
@@ -687,7 +719,7 @@
           </a:lstStyle>
           <a:p>
             <a:r>
-              <a:rPr lang="en-US"/>
+              <a:rPr lang="en-US" smtClean="0"/>
               <a:t>Click to edit Master title style</a:t>
             </a:r>
             <a:endParaRPr lang="en-US" dirty="0"/>
@@ -807,7 +839,7 @@
           </a:lstStyle>
           <a:p>
             <a:r>
-              <a:rPr lang="en-US"/>
+              <a:rPr lang="en-US" smtClean="0"/>
               <a:t>Click to edit Master subtitle style</a:t>
             </a:r>
             <a:endParaRPr lang="en-US" dirty="0"/>
@@ -831,7 +863,7 @@
           <a:p>
             <a:fld id="{EA6F526D-4AFC-4508-9DBC-E9D120CA701E}" type="datetimeFigureOut">
               <a:rPr lang="en-IN" smtClean="0"/>
-              <a:t>23-03-2024</a:t>
+              <a:t>24-03-2024</a:t>
             </a:fld>
             <a:endParaRPr lang="en-IN"/>
           </a:p>
@@ -882,7 +914,7 @@
     </p:spTree>
     <p:extLst>
       <p:ext uri="{BB962C8B-B14F-4D97-AF65-F5344CB8AC3E}">
-        <p14:creationId xmlns:p14="http://schemas.microsoft.com/office/powerpoint/2010/main" val="2057760228"/>
+        <p14:creationId xmlns:p14="http://schemas.microsoft.com/office/powerpoint/2010/main" val="256314493"/>
       </p:ext>
     </p:extLst>
   </p:cSld>
@@ -936,7 +968,7 @@
           </a:lstStyle>
           <a:p>
             <a:r>
-              <a:rPr lang="en-US"/>
+              <a:rPr lang="en-US" smtClean="0"/>
               <a:t>Click to edit Master title style</a:t>
             </a:r>
             <a:endParaRPr lang="en-US" dirty="0"/>
@@ -1059,8 +1091,8 @@
           <a:p>
             <a:pPr lvl="0"/>
             <a:r>
-              <a:rPr lang="en-US"/>
-              <a:t>Click to edit Master text styles</a:t>
+              <a:rPr lang="en-US" smtClean="0"/>
+              <a:t>Edit Master text styles</a:t>
             </a:r>
           </a:p>
         </p:txBody>
@@ -1082,7 +1114,7 @@
           <a:p>
             <a:fld id="{EA6F526D-4AFC-4508-9DBC-E9D120CA701E}" type="datetimeFigureOut">
               <a:rPr lang="en-IN" smtClean="0"/>
-              <a:t>23-03-2024</a:t>
+              <a:t>24-03-2024</a:t>
             </a:fld>
             <a:endParaRPr lang="en-IN"/>
           </a:p>
@@ -1133,7 +1165,7 @@
     </p:spTree>
     <p:extLst>
       <p:ext uri="{BB962C8B-B14F-4D97-AF65-F5344CB8AC3E}">
-        <p14:creationId xmlns:p14="http://schemas.microsoft.com/office/powerpoint/2010/main" val="1675745779"/>
+        <p14:creationId xmlns:p14="http://schemas.microsoft.com/office/powerpoint/2010/main" val="4229601075"/>
       </p:ext>
     </p:extLst>
   </p:cSld>
@@ -1187,7 +1219,7 @@
           </a:lstStyle>
           <a:p>
             <a:r>
-              <a:rPr lang="en-US"/>
+              <a:rPr lang="en-US" smtClean="0"/>
               <a:t>Click to edit Master title style</a:t>
             </a:r>
             <a:endParaRPr lang="en-US" dirty="0"/>
@@ -1251,8 +1283,8 @@
           <a:p>
             <a:pPr lvl="0"/>
             <a:r>
-              <a:rPr lang="en-US"/>
-              <a:t>Click to edit Master text styles</a:t>
+              <a:rPr lang="en-US" smtClean="0"/>
+              <a:t>Edit Master text styles</a:t>
             </a:r>
           </a:p>
         </p:txBody>
@@ -1373,8 +1405,8 @@
           <a:p>
             <a:pPr lvl="0"/>
             <a:r>
-              <a:rPr lang="en-US"/>
-              <a:t>Click to edit Master text styles</a:t>
+              <a:rPr lang="en-US" smtClean="0"/>
+              <a:t>Edit Master text styles</a:t>
             </a:r>
           </a:p>
         </p:txBody>
@@ -1396,7 +1428,7 @@
           <a:p>
             <a:fld id="{EA6F526D-4AFC-4508-9DBC-E9D120CA701E}" type="datetimeFigureOut">
               <a:rPr lang="en-IN" smtClean="0"/>
-              <a:t>23-03-2024</a:t>
+              <a:t>24-03-2024</a:t>
             </a:fld>
             <a:endParaRPr lang="en-IN"/>
           </a:p>
@@ -1446,7 +1478,7 @@
       </p:sp>
       <p:sp>
         <p:nvSpPr>
-          <p:cNvPr id="20" name="TextBox 19"/>
+          <p:cNvPr id="24" name="TextBox 23"/>
           <p:cNvSpPr txBox="1"/>
           <p:nvPr/>
         </p:nvSpPr>
@@ -1487,7 +1519,7 @@
       </p:sp>
       <p:sp>
         <p:nvSpPr>
-          <p:cNvPr id="22" name="TextBox 21"/>
+          <p:cNvPr id="25" name="TextBox 24"/>
           <p:cNvSpPr txBox="1"/>
           <p:nvPr/>
         </p:nvSpPr>
@@ -1518,26 +1550,18 @@
                     <a:lumOff val="40000"/>
                   </a:schemeClr>
                 </a:solidFill>
+                <a:effectLst/>
                 <a:latin typeface="Arial"/>
               </a:rPr>
               <a:t>”</a:t>
             </a:r>
-            <a:endParaRPr lang="en-US" dirty="0">
-              <a:solidFill>
-                <a:schemeClr val="accent1">
-                  <a:lumMod val="60000"/>
-                  <a:lumOff val="40000"/>
-                </a:schemeClr>
-              </a:solidFill>
-              <a:latin typeface="Arial"/>
-            </a:endParaRPr>
           </a:p>
         </p:txBody>
       </p:sp>
     </p:spTree>
     <p:extLst>
       <p:ext uri="{BB962C8B-B14F-4D97-AF65-F5344CB8AC3E}">
-        <p14:creationId xmlns:p14="http://schemas.microsoft.com/office/powerpoint/2010/main" val="2964482471"/>
+        <p14:creationId xmlns:p14="http://schemas.microsoft.com/office/powerpoint/2010/main" val="843308014"/>
       </p:ext>
     </p:extLst>
   </p:cSld>
@@ -1591,7 +1615,7 @@
           </a:lstStyle>
           <a:p>
             <a:r>
-              <a:rPr lang="en-US"/>
+              <a:rPr lang="en-US" smtClean="0"/>
               <a:t>Click to edit Master title style</a:t>
             </a:r>
             <a:endParaRPr lang="en-US" dirty="0"/>
@@ -1714,8 +1738,8 @@
           <a:p>
             <a:pPr lvl="0"/>
             <a:r>
-              <a:rPr lang="en-US"/>
-              <a:t>Click to edit Master text styles</a:t>
+              <a:rPr lang="en-US" smtClean="0"/>
+              <a:t>Edit Master text styles</a:t>
             </a:r>
           </a:p>
         </p:txBody>
@@ -1737,7 +1761,7 @@
           <a:p>
             <a:fld id="{EA6F526D-4AFC-4508-9DBC-E9D120CA701E}" type="datetimeFigureOut">
               <a:rPr lang="en-IN" smtClean="0"/>
-              <a:t>23-03-2024</a:t>
+              <a:t>24-03-2024</a:t>
             </a:fld>
             <a:endParaRPr lang="en-IN"/>
           </a:p>
@@ -1788,7 +1812,7 @@
     </p:spTree>
     <p:extLst>
       <p:ext uri="{BB962C8B-B14F-4D97-AF65-F5344CB8AC3E}">
-        <p14:creationId xmlns:p14="http://schemas.microsoft.com/office/powerpoint/2010/main" val="406471153"/>
+        <p14:creationId xmlns:p14="http://schemas.microsoft.com/office/powerpoint/2010/main" val="707755610"/>
       </p:ext>
     </p:extLst>
   </p:cSld>
@@ -1842,7 +1866,7 @@
           </a:lstStyle>
           <a:p>
             <a:r>
-              <a:rPr lang="en-US"/>
+              <a:rPr lang="en-US" smtClean="0"/>
               <a:t>Click to edit Master title style</a:t>
             </a:r>
             <a:endParaRPr lang="en-US" dirty="0"/>
@@ -1906,8 +1930,8 @@
           <a:p>
             <a:pPr lvl="0"/>
             <a:r>
-              <a:rPr lang="en-US"/>
-              <a:t>Click to edit Master text styles</a:t>
+              <a:rPr lang="en-US" smtClean="0"/>
+              <a:t>Edit Master text styles</a:t>
             </a:r>
           </a:p>
         </p:txBody>
@@ -2028,8 +2052,8 @@
           <a:p>
             <a:pPr lvl="0"/>
             <a:r>
-              <a:rPr lang="en-US"/>
-              <a:t>Click to edit Master text styles</a:t>
+              <a:rPr lang="en-US" smtClean="0"/>
+              <a:t>Edit Master text styles</a:t>
             </a:r>
           </a:p>
         </p:txBody>
@@ -2051,7 +2075,7 @@
           <a:p>
             <a:fld id="{EA6F526D-4AFC-4508-9DBC-E9D120CA701E}" type="datetimeFigureOut">
               <a:rPr lang="en-IN" smtClean="0"/>
-              <a:t>23-03-2024</a:t>
+              <a:t>24-03-2024</a:t>
             </a:fld>
             <a:endParaRPr lang="en-IN"/>
           </a:p>
@@ -2184,7 +2208,7 @@
     </p:spTree>
     <p:extLst>
       <p:ext uri="{BB962C8B-B14F-4D97-AF65-F5344CB8AC3E}">
-        <p14:creationId xmlns:p14="http://schemas.microsoft.com/office/powerpoint/2010/main" val="2262298095"/>
+        <p14:creationId xmlns:p14="http://schemas.microsoft.com/office/powerpoint/2010/main" val="4236883105"/>
       </p:ext>
     </p:extLst>
   </p:cSld>
@@ -2238,7 +2262,7 @@
           </a:lstStyle>
           <a:p>
             <a:r>
-              <a:rPr lang="en-US"/>
+              <a:rPr lang="en-US" smtClean="0"/>
               <a:t>Click to edit Master title style</a:t>
             </a:r>
             <a:endParaRPr lang="en-US" dirty="0"/>
@@ -2299,8 +2323,8 @@
           <a:p>
             <a:pPr lvl="0"/>
             <a:r>
-              <a:rPr lang="en-US"/>
-              <a:t>Click to edit Master text styles</a:t>
+              <a:rPr lang="en-US" smtClean="0"/>
+              <a:t>Edit Master text styles</a:t>
             </a:r>
           </a:p>
         </p:txBody>
@@ -2421,8 +2445,8 @@
           <a:p>
             <a:pPr lvl="0"/>
             <a:r>
-              <a:rPr lang="en-US"/>
-              <a:t>Click to edit Master text styles</a:t>
+              <a:rPr lang="en-US" smtClean="0"/>
+              <a:t>Edit Master text styles</a:t>
             </a:r>
           </a:p>
         </p:txBody>
@@ -2444,7 +2468,7 @@
           <a:p>
             <a:fld id="{EA6F526D-4AFC-4508-9DBC-E9D120CA701E}" type="datetimeFigureOut">
               <a:rPr lang="en-IN" smtClean="0"/>
-              <a:t>23-03-2024</a:t>
+              <a:t>24-03-2024</a:t>
             </a:fld>
             <a:endParaRPr lang="en-IN"/>
           </a:p>
@@ -2495,7 +2519,7 @@
     </p:spTree>
     <p:extLst>
       <p:ext uri="{BB962C8B-B14F-4D97-AF65-F5344CB8AC3E}">
-        <p14:creationId xmlns:p14="http://schemas.microsoft.com/office/powerpoint/2010/main" val="980944288"/>
+        <p14:creationId xmlns:p14="http://schemas.microsoft.com/office/powerpoint/2010/main" val="1319405544"/>
       </p:ext>
     </p:extLst>
   </p:cSld>
@@ -2538,7 +2562,7 @@
           <a:lstStyle/>
           <a:p>
             <a:r>
-              <a:rPr lang="en-US"/>
+              <a:rPr lang="en-US" smtClean="0"/>
               <a:t>Click to edit Master title style</a:t>
             </a:r>
             <a:endParaRPr lang="en-US" dirty="0"/>
@@ -2562,35 +2586,35 @@
           <a:p>
             <a:pPr lvl="0"/>
             <a:r>
-              <a:rPr lang="en-US"/>
-              <a:t>Click to edit Master text styles</a:t>
+              <a:rPr lang="en-US" smtClean="0"/>
+              <a:t>Edit Master text styles</a:t>
             </a:r>
           </a:p>
           <a:p>
             <a:pPr lvl="1"/>
             <a:r>
-              <a:rPr lang="en-US"/>
+              <a:rPr lang="en-US" smtClean="0"/>
               <a:t>Second level</a:t>
             </a:r>
           </a:p>
           <a:p>
             <a:pPr lvl="2"/>
             <a:r>
-              <a:rPr lang="en-US"/>
+              <a:rPr lang="en-US" smtClean="0"/>
               <a:t>Third level</a:t>
             </a:r>
           </a:p>
           <a:p>
             <a:pPr lvl="3"/>
             <a:r>
-              <a:rPr lang="en-US"/>
+              <a:rPr lang="en-US" smtClean="0"/>
               <a:t>Fourth level</a:t>
             </a:r>
           </a:p>
           <a:p>
             <a:pPr lvl="4"/>
             <a:r>
-              <a:rPr lang="en-US"/>
+              <a:rPr lang="en-US" smtClean="0"/>
               <a:t>Fifth level</a:t>
             </a:r>
             <a:endParaRPr lang="en-US" dirty="0"/>
@@ -2614,7 +2638,7 @@
           <a:p>
             <a:fld id="{EA6F526D-4AFC-4508-9DBC-E9D120CA701E}" type="datetimeFigureOut">
               <a:rPr lang="en-IN" smtClean="0"/>
-              <a:t>23-03-2024</a:t>
+              <a:t>24-03-2024</a:t>
             </a:fld>
             <a:endParaRPr lang="en-IN"/>
           </a:p>
@@ -2665,7 +2689,7 @@
     </p:spTree>
     <p:extLst>
       <p:ext uri="{BB962C8B-B14F-4D97-AF65-F5344CB8AC3E}">
-        <p14:creationId xmlns:p14="http://schemas.microsoft.com/office/powerpoint/2010/main" val="3893843282"/>
+        <p14:creationId xmlns:p14="http://schemas.microsoft.com/office/powerpoint/2010/main" val="2881157790"/>
       </p:ext>
     </p:extLst>
   </p:cSld>
@@ -2713,7 +2737,7 @@
           <a:lstStyle/>
           <a:p>
             <a:r>
-              <a:rPr lang="en-US"/>
+              <a:rPr lang="en-US" smtClean="0"/>
               <a:t>Click to edit Master title style</a:t>
             </a:r>
             <a:endParaRPr lang="en-US" dirty="0"/>
@@ -2742,35 +2766,35 @@
           <a:p>
             <a:pPr lvl="0"/>
             <a:r>
-              <a:rPr lang="en-US"/>
-              <a:t>Click to edit Master text styles</a:t>
+              <a:rPr lang="en-US" smtClean="0"/>
+              <a:t>Edit Master text styles</a:t>
             </a:r>
           </a:p>
           <a:p>
             <a:pPr lvl="1"/>
             <a:r>
-              <a:rPr lang="en-US"/>
+              <a:rPr lang="en-US" smtClean="0"/>
               <a:t>Second level</a:t>
             </a:r>
           </a:p>
           <a:p>
             <a:pPr lvl="2"/>
             <a:r>
-              <a:rPr lang="en-US"/>
+              <a:rPr lang="en-US" smtClean="0"/>
               <a:t>Third level</a:t>
             </a:r>
           </a:p>
           <a:p>
             <a:pPr lvl="3"/>
             <a:r>
-              <a:rPr lang="en-US"/>
+              <a:rPr lang="en-US" smtClean="0"/>
               <a:t>Fourth level</a:t>
             </a:r>
           </a:p>
           <a:p>
             <a:pPr lvl="4"/>
             <a:r>
-              <a:rPr lang="en-US"/>
+              <a:rPr lang="en-US" smtClean="0"/>
               <a:t>Fifth level</a:t>
             </a:r>
             <a:endParaRPr lang="en-US" dirty="0"/>
@@ -2794,7 +2818,7 @@
           <a:p>
             <a:fld id="{EA6F526D-4AFC-4508-9DBC-E9D120CA701E}" type="datetimeFigureOut">
               <a:rPr lang="en-IN" smtClean="0"/>
-              <a:t>23-03-2024</a:t>
+              <a:t>24-03-2024</a:t>
             </a:fld>
             <a:endParaRPr lang="en-IN"/>
           </a:p>
@@ -2845,7 +2869,7 @@
     </p:spTree>
     <p:extLst>
       <p:ext uri="{BB962C8B-B14F-4D97-AF65-F5344CB8AC3E}">
-        <p14:creationId xmlns:p14="http://schemas.microsoft.com/office/powerpoint/2010/main" val="3761126426"/>
+        <p14:creationId xmlns:p14="http://schemas.microsoft.com/office/powerpoint/2010/main" val="2472165027"/>
       </p:ext>
     </p:extLst>
   </p:cSld>
@@ -2884,70 +2908,12 @@
         </p:nvSpPr>
         <p:spPr/>
         <p:txBody>
-          <a:bodyPr>
-            <a:normAutofit/>
-          </a:bodyPr>
-          <a:lstStyle>
-            <a:lvl1pPr>
-              <a:defRPr sz="3600"/>
-            </a:lvl1pPr>
-          </a:lstStyle>
-          <a:p>
-            <a:r>
-              <a:rPr lang="en-US"/>
-              <a:t>Click to edit Master title style</a:t>
-            </a:r>
-            <a:endParaRPr lang="en-US" dirty="0"/>
-          </a:p>
-        </p:txBody>
-      </p:sp>
-      <p:sp>
-        <p:nvSpPr>
-          <p:cNvPr id="3" name="Content Placeholder 2"/>
-          <p:cNvSpPr>
-            <a:spLocks noGrp="1"/>
-          </p:cNvSpPr>
-          <p:nvPr>
-            <p:ph idx="1"/>
-          </p:nvPr>
-        </p:nvSpPr>
-        <p:spPr/>
-        <p:txBody>
           <a:bodyPr/>
           <a:lstStyle/>
           <a:p>
-            <a:pPr lvl="0"/>
-            <a:r>
-              <a:rPr lang="en-US"/>
-              <a:t>Click to edit Master text styles</a:t>
-            </a:r>
-          </a:p>
-          <a:p>
-            <a:pPr lvl="1"/>
-            <a:r>
-              <a:rPr lang="en-US"/>
-              <a:t>Second level</a:t>
-            </a:r>
-          </a:p>
-          <a:p>
-            <a:pPr lvl="2"/>
-            <a:r>
-              <a:rPr lang="en-US"/>
-              <a:t>Third level</a:t>
-            </a:r>
-          </a:p>
-          <a:p>
-            <a:pPr lvl="3"/>
-            <a:r>
-              <a:rPr lang="en-US"/>
-              <a:t>Fourth level</a:t>
-            </a:r>
-          </a:p>
-          <a:p>
-            <a:pPr lvl="4"/>
-            <a:r>
-              <a:rPr lang="en-US"/>
-              <a:t>Fifth level</a:t>
+            <a:r>
+              <a:rPr lang="en-US" smtClean="0"/>
+              <a:t>Click to edit Master title style</a:t>
             </a:r>
             <a:endParaRPr lang="en-US" dirty="0"/>
           </a:p>
@@ -2955,12 +2921,12 @@
       </p:sp>
       <p:sp>
         <p:nvSpPr>
-          <p:cNvPr id="4" name="Date Placeholder 3"/>
-          <p:cNvSpPr>
-            <a:spLocks noGrp="1"/>
-          </p:cNvSpPr>
-          <p:nvPr>
-            <p:ph type="dt" sz="half" idx="10"/>
+          <p:cNvPr id="3" name="Content Placeholder 2"/>
+          <p:cNvSpPr>
+            <a:spLocks noGrp="1"/>
+          </p:cNvSpPr>
+          <p:nvPr>
+            <p:ph idx="1"/>
           </p:nvPr>
         </p:nvSpPr>
         <p:spPr/>
@@ -2968,9 +2934,61 @@
           <a:bodyPr/>
           <a:lstStyle/>
           <a:p>
+            <a:pPr lvl="0"/>
+            <a:r>
+              <a:rPr lang="en-US" smtClean="0"/>
+              <a:t>Edit Master text styles</a:t>
+            </a:r>
+          </a:p>
+          <a:p>
+            <a:pPr lvl="1"/>
+            <a:r>
+              <a:rPr lang="en-US" smtClean="0"/>
+              <a:t>Second level</a:t>
+            </a:r>
+          </a:p>
+          <a:p>
+            <a:pPr lvl="2"/>
+            <a:r>
+              <a:rPr lang="en-US" smtClean="0"/>
+              <a:t>Third level</a:t>
+            </a:r>
+          </a:p>
+          <a:p>
+            <a:pPr lvl="3"/>
+            <a:r>
+              <a:rPr lang="en-US" smtClean="0"/>
+              <a:t>Fourth level</a:t>
+            </a:r>
+          </a:p>
+          <a:p>
+            <a:pPr lvl="4"/>
+            <a:r>
+              <a:rPr lang="en-US" smtClean="0"/>
+              <a:t>Fifth level</a:t>
+            </a:r>
+            <a:endParaRPr lang="en-US" dirty="0"/>
+          </a:p>
+        </p:txBody>
+      </p:sp>
+      <p:sp>
+        <p:nvSpPr>
+          <p:cNvPr id="4" name="Date Placeholder 3"/>
+          <p:cNvSpPr>
+            <a:spLocks noGrp="1"/>
+          </p:cNvSpPr>
+          <p:nvPr>
+            <p:ph type="dt" sz="half" idx="10"/>
+          </p:nvPr>
+        </p:nvSpPr>
+        <p:spPr/>
+        <p:txBody>
+          <a:bodyPr/>
+          <a:lstStyle/>
+          <a:p>
             <a:fld id="{EA6F526D-4AFC-4508-9DBC-E9D120CA701E}" type="datetimeFigureOut">
               <a:rPr lang="en-IN" smtClean="0"/>
-              <a:t>23-03-2024</a:t>
+              <a:t>24-03-2024</a:t>
             </a:fld>
             <a:endParaRPr lang="en-IN"/>
           </a:p>
@@ -3021,7 +3039,7 @@
     </p:spTree>
     <p:extLst>
       <p:ext uri="{BB962C8B-B14F-4D97-AF65-F5344CB8AC3E}">
-        <p14:creationId xmlns:p14="http://schemas.microsoft.com/office/powerpoint/2010/main" val="3523246884"/>
+        <p14:creationId xmlns:p14="http://schemas.microsoft.com/office/powerpoint/2010/main" val="1864103439"/>
       </p:ext>
     </p:extLst>
   </p:cSld>
@@ -3073,7 +3091,7 @@
           </a:lstStyle>
           <a:p>
             <a:r>
-              <a:rPr lang="en-US"/>
+              <a:rPr lang="en-US" smtClean="0"/>
               <a:t>Click to edit Master title style</a:t>
             </a:r>
             <a:endParaRPr lang="en-US" dirty="0"/>
@@ -3194,8 +3212,8 @@
           <a:p>
             <a:pPr lvl="0"/>
             <a:r>
-              <a:rPr lang="en-US"/>
-              <a:t>Click to edit Master text styles</a:t>
+              <a:rPr lang="en-US" smtClean="0"/>
+              <a:t>Edit Master text styles</a:t>
             </a:r>
           </a:p>
         </p:txBody>
@@ -3217,7 +3235,7 @@
           <a:p>
             <a:fld id="{EA6F526D-4AFC-4508-9DBC-E9D120CA701E}" type="datetimeFigureOut">
               <a:rPr lang="en-IN" smtClean="0"/>
-              <a:t>23-03-2024</a:t>
+              <a:t>24-03-2024</a:t>
             </a:fld>
             <a:endParaRPr lang="en-IN"/>
           </a:p>
@@ -3268,7 +3286,7 @@
     </p:spTree>
     <p:extLst>
       <p:ext uri="{BB962C8B-B14F-4D97-AF65-F5344CB8AC3E}">
-        <p14:creationId xmlns:p14="http://schemas.microsoft.com/office/powerpoint/2010/main" val="1800839706"/>
+        <p14:creationId xmlns:p14="http://schemas.microsoft.com/office/powerpoint/2010/main" val="107792425"/>
       </p:ext>
     </p:extLst>
   </p:cSld>
@@ -3311,7 +3329,7 @@
           <a:lstStyle/>
           <a:p>
             <a:r>
-              <a:rPr lang="en-US"/>
+              <a:rPr lang="en-US" smtClean="0"/>
               <a:t>Click to edit Master title style</a:t>
             </a:r>
             <a:endParaRPr lang="en-US" dirty="0"/>
@@ -3340,35 +3358,35 @@
           <a:p>
             <a:pPr lvl="0"/>
             <a:r>
-              <a:rPr lang="en-US"/>
-              <a:t>Click to edit Master text styles</a:t>
+              <a:rPr lang="en-US" smtClean="0"/>
+              <a:t>Edit Master text styles</a:t>
             </a:r>
           </a:p>
           <a:p>
             <a:pPr lvl="1"/>
             <a:r>
-              <a:rPr lang="en-US"/>
+              <a:rPr lang="en-US" smtClean="0"/>
               <a:t>Second level</a:t>
             </a:r>
           </a:p>
           <a:p>
             <a:pPr lvl="2"/>
             <a:r>
-              <a:rPr lang="en-US"/>
+              <a:rPr lang="en-US" smtClean="0"/>
               <a:t>Third level</a:t>
             </a:r>
           </a:p>
           <a:p>
             <a:pPr lvl="3"/>
             <a:r>
-              <a:rPr lang="en-US"/>
+              <a:rPr lang="en-US" smtClean="0"/>
               <a:t>Fourth level</a:t>
             </a:r>
           </a:p>
           <a:p>
             <a:pPr lvl="4"/>
             <a:r>
-              <a:rPr lang="en-US"/>
+              <a:rPr lang="en-US" smtClean="0"/>
               <a:t>Fifth level</a:t>
             </a:r>
             <a:endParaRPr lang="en-US" dirty="0"/>
@@ -3397,35 +3415,35 @@
           <a:p>
             <a:pPr lvl="0"/>
             <a:r>
-              <a:rPr lang="en-US"/>
-              <a:t>Click to edit Master text styles</a:t>
+              <a:rPr lang="en-US" smtClean="0"/>
+              <a:t>Edit Master text styles</a:t>
             </a:r>
           </a:p>
           <a:p>
             <a:pPr lvl="1"/>
             <a:r>
-              <a:rPr lang="en-US"/>
+              <a:rPr lang="en-US" smtClean="0"/>
               <a:t>Second level</a:t>
             </a:r>
           </a:p>
           <a:p>
             <a:pPr lvl="2"/>
             <a:r>
-              <a:rPr lang="en-US"/>
+              <a:rPr lang="en-US" smtClean="0"/>
               <a:t>Third level</a:t>
             </a:r>
           </a:p>
           <a:p>
             <a:pPr lvl="3"/>
             <a:r>
-              <a:rPr lang="en-US"/>
+              <a:rPr lang="en-US" smtClean="0"/>
               <a:t>Fourth level</a:t>
             </a:r>
           </a:p>
           <a:p>
             <a:pPr lvl="4"/>
             <a:r>
-              <a:rPr lang="en-US"/>
+              <a:rPr lang="en-US" smtClean="0"/>
               <a:t>Fifth level</a:t>
             </a:r>
             <a:endParaRPr lang="en-US" dirty="0"/>
@@ -3449,7 +3467,7 @@
           <a:p>
             <a:fld id="{EA6F526D-4AFC-4508-9DBC-E9D120CA701E}" type="datetimeFigureOut">
               <a:rPr lang="en-IN" smtClean="0"/>
-              <a:t>23-03-2024</a:t>
+              <a:t>24-03-2024</a:t>
             </a:fld>
             <a:endParaRPr lang="en-IN"/>
           </a:p>
@@ -3500,7 +3518,7 @@
     </p:spTree>
     <p:extLst>
       <p:ext uri="{BB962C8B-B14F-4D97-AF65-F5344CB8AC3E}">
-        <p14:creationId xmlns:p14="http://schemas.microsoft.com/office/powerpoint/2010/main" val="826847500"/>
+        <p14:creationId xmlns:p14="http://schemas.microsoft.com/office/powerpoint/2010/main" val="3399258849"/>
       </p:ext>
     </p:extLst>
   </p:cSld>
@@ -3547,7 +3565,7 @@
           </a:lstStyle>
           <a:p>
             <a:r>
-              <a:rPr lang="en-US"/>
+              <a:rPr lang="en-US" smtClean="0"/>
               <a:t>Click to edit Master title style</a:t>
             </a:r>
             <a:endParaRPr lang="en-US" dirty="0"/>
@@ -3615,8 +3633,8 @@
           <a:p>
             <a:pPr lvl="0"/>
             <a:r>
-              <a:rPr lang="en-US"/>
-              <a:t>Click to edit Master text styles</a:t>
+              <a:rPr lang="en-US" smtClean="0"/>
+              <a:t>Edit Master text styles</a:t>
             </a:r>
           </a:p>
         </p:txBody>
@@ -3645,35 +3663,35 @@
           <a:p>
             <a:pPr lvl="0"/>
             <a:r>
-              <a:rPr lang="en-US"/>
-              <a:t>Click to edit Master text styles</a:t>
+              <a:rPr lang="en-US" smtClean="0"/>
+              <a:t>Edit Master text styles</a:t>
             </a:r>
           </a:p>
           <a:p>
             <a:pPr lvl="1"/>
             <a:r>
-              <a:rPr lang="en-US"/>
+              <a:rPr lang="en-US" smtClean="0"/>
               <a:t>Second level</a:t>
             </a:r>
           </a:p>
           <a:p>
             <a:pPr lvl="2"/>
             <a:r>
-              <a:rPr lang="en-US"/>
+              <a:rPr lang="en-US" smtClean="0"/>
               <a:t>Third level</a:t>
             </a:r>
           </a:p>
           <a:p>
             <a:pPr lvl="3"/>
             <a:r>
-              <a:rPr lang="en-US"/>
+              <a:rPr lang="en-US" smtClean="0"/>
               <a:t>Fourth level</a:t>
             </a:r>
           </a:p>
           <a:p>
             <a:pPr lvl="4"/>
             <a:r>
-              <a:rPr lang="en-US"/>
+              <a:rPr lang="en-US" smtClean="0"/>
               <a:t>Fifth level</a:t>
             </a:r>
             <a:endParaRPr lang="en-US" dirty="0"/>
@@ -3741,8 +3759,8 @@
           <a:p>
             <a:pPr lvl="0"/>
             <a:r>
-              <a:rPr lang="en-US"/>
-              <a:t>Click to edit Master text styles</a:t>
+              <a:rPr lang="en-US" smtClean="0"/>
+              <a:t>Edit Master text styles</a:t>
             </a:r>
           </a:p>
         </p:txBody>
@@ -3771,35 +3789,35 @@
           <a:p>
             <a:pPr lvl="0"/>
             <a:r>
-              <a:rPr lang="en-US"/>
-              <a:t>Click to edit Master text styles</a:t>
+              <a:rPr lang="en-US" smtClean="0"/>
+              <a:t>Edit Master text styles</a:t>
             </a:r>
           </a:p>
           <a:p>
             <a:pPr lvl="1"/>
             <a:r>
-              <a:rPr lang="en-US"/>
+              <a:rPr lang="en-US" smtClean="0"/>
               <a:t>Second level</a:t>
             </a:r>
           </a:p>
           <a:p>
             <a:pPr lvl="2"/>
             <a:r>
-              <a:rPr lang="en-US"/>
+              <a:rPr lang="en-US" smtClean="0"/>
               <a:t>Third level</a:t>
             </a:r>
           </a:p>
           <a:p>
             <a:pPr lvl="3"/>
             <a:r>
-              <a:rPr lang="en-US"/>
+              <a:rPr lang="en-US" smtClean="0"/>
               <a:t>Fourth level</a:t>
             </a:r>
           </a:p>
           <a:p>
             <a:pPr lvl="4"/>
             <a:r>
-              <a:rPr lang="en-US"/>
+              <a:rPr lang="en-US" smtClean="0"/>
               <a:t>Fifth level</a:t>
             </a:r>
             <a:endParaRPr lang="en-US" dirty="0"/>
@@ -3823,7 +3841,7 @@
           <a:p>
             <a:fld id="{EA6F526D-4AFC-4508-9DBC-E9D120CA701E}" type="datetimeFigureOut">
               <a:rPr lang="en-IN" smtClean="0"/>
-              <a:t>23-03-2024</a:t>
+              <a:t>24-03-2024</a:t>
             </a:fld>
             <a:endParaRPr lang="en-IN"/>
           </a:p>
@@ -3874,7 +3892,7 @@
     </p:spTree>
     <p:extLst>
       <p:ext uri="{BB962C8B-B14F-4D97-AF65-F5344CB8AC3E}">
-        <p14:creationId xmlns:p14="http://schemas.microsoft.com/office/powerpoint/2010/main" val="4211442022"/>
+        <p14:creationId xmlns:p14="http://schemas.microsoft.com/office/powerpoint/2010/main" val="3196905159"/>
       </p:ext>
     </p:extLst>
   </p:cSld>
@@ -3922,7 +3940,7 @@
           <a:lstStyle/>
           <a:p>
             <a:r>
-              <a:rPr lang="en-US"/>
+              <a:rPr lang="en-US" smtClean="0"/>
               <a:t>Click to edit Master title style</a:t>
             </a:r>
             <a:endParaRPr lang="en-US" dirty="0"/>
@@ -3946,7 +3964,7 @@
           <a:p>
             <a:fld id="{EA6F526D-4AFC-4508-9DBC-E9D120CA701E}" type="datetimeFigureOut">
               <a:rPr lang="en-IN" smtClean="0"/>
-              <a:t>23-03-2024</a:t>
+              <a:t>24-03-2024</a:t>
             </a:fld>
             <a:endParaRPr lang="en-IN"/>
           </a:p>
@@ -3997,7 +4015,7 @@
     </p:spTree>
     <p:extLst>
       <p:ext uri="{BB962C8B-B14F-4D97-AF65-F5344CB8AC3E}">
-        <p14:creationId xmlns:p14="http://schemas.microsoft.com/office/powerpoint/2010/main" val="159582356"/>
+        <p14:creationId xmlns:p14="http://schemas.microsoft.com/office/powerpoint/2010/main" val="1818005692"/>
       </p:ext>
     </p:extLst>
   </p:cSld>
@@ -4041,7 +4059,7 @@
           <a:p>
             <a:fld id="{EA6F526D-4AFC-4508-9DBC-E9D120CA701E}" type="datetimeFigureOut">
               <a:rPr lang="en-IN" smtClean="0"/>
-              <a:t>23-03-2024</a:t>
+              <a:t>24-03-2024</a:t>
             </a:fld>
             <a:endParaRPr lang="en-IN"/>
           </a:p>
@@ -4092,7 +4110,7 @@
     </p:spTree>
     <p:extLst>
       <p:ext uri="{BB962C8B-B14F-4D97-AF65-F5344CB8AC3E}">
-        <p14:creationId xmlns:p14="http://schemas.microsoft.com/office/powerpoint/2010/main" val="1686087427"/>
+        <p14:creationId xmlns:p14="http://schemas.microsoft.com/office/powerpoint/2010/main" val="294274185"/>
       </p:ext>
     </p:extLst>
   </p:cSld>
@@ -4146,7 +4164,7 @@
           </a:lstStyle>
           <a:p>
             <a:r>
-              <a:rPr lang="en-US"/>
+              <a:rPr lang="en-US" smtClean="0"/>
               <a:t>Click to edit Master title style</a:t>
             </a:r>
             <a:endParaRPr lang="en-US" dirty="0"/>
@@ -4177,35 +4195,35 @@
           <a:p>
             <a:pPr lvl="0"/>
             <a:r>
-              <a:rPr lang="en-US"/>
-              <a:t>Click to edit Master text styles</a:t>
+              <a:rPr lang="en-US" smtClean="0"/>
+              <a:t>Edit Master text styles</a:t>
             </a:r>
           </a:p>
           <a:p>
             <a:pPr lvl="1"/>
             <a:r>
-              <a:rPr lang="en-US"/>
+              <a:rPr lang="en-US" smtClean="0"/>
               <a:t>Second level</a:t>
             </a:r>
           </a:p>
           <a:p>
             <a:pPr lvl="2"/>
             <a:r>
-              <a:rPr lang="en-US"/>
+              <a:rPr lang="en-US" smtClean="0"/>
               <a:t>Third level</a:t>
             </a:r>
           </a:p>
           <a:p>
             <a:pPr lvl="3"/>
             <a:r>
-              <a:rPr lang="en-US"/>
+              <a:rPr lang="en-US" smtClean="0"/>
               <a:t>Fourth level</a:t>
             </a:r>
           </a:p>
           <a:p>
             <a:pPr lvl="4"/>
             <a:r>
-              <a:rPr lang="en-US"/>
+              <a:rPr lang="en-US" smtClean="0"/>
               <a:t>Fifth level</a:t>
             </a:r>
             <a:endParaRPr lang="en-US" dirty="0"/>
@@ -4273,8 +4291,8 @@
           <a:p>
             <a:pPr lvl="0"/>
             <a:r>
-              <a:rPr lang="en-US"/>
-              <a:t>Click to edit Master text styles</a:t>
+              <a:rPr lang="en-US" smtClean="0"/>
+              <a:t>Edit Master text styles</a:t>
             </a:r>
           </a:p>
         </p:txBody>
@@ -4296,7 +4314,7 @@
           <a:p>
             <a:fld id="{EA6F526D-4AFC-4508-9DBC-E9D120CA701E}" type="datetimeFigureOut">
               <a:rPr lang="en-IN" smtClean="0"/>
-              <a:t>23-03-2024</a:t>
+              <a:t>24-03-2024</a:t>
             </a:fld>
             <a:endParaRPr lang="en-IN"/>
           </a:p>
@@ -4347,7 +4365,7 @@
     </p:spTree>
     <p:extLst>
       <p:ext uri="{BB962C8B-B14F-4D97-AF65-F5344CB8AC3E}">
-        <p14:creationId xmlns:p14="http://schemas.microsoft.com/office/powerpoint/2010/main" val="225096865"/>
+        <p14:creationId xmlns:p14="http://schemas.microsoft.com/office/powerpoint/2010/main" val="805400731"/>
       </p:ext>
     </p:extLst>
   </p:cSld>
@@ -4401,7 +4419,7 @@
           </a:lstStyle>
           <a:p>
             <a:r>
-              <a:rPr lang="en-US"/>
+              <a:rPr lang="en-US" smtClean="0"/>
               <a:t>Click to edit Master title style</a:t>
             </a:r>
             <a:endParaRPr lang="en-US" dirty="0"/>
@@ -4468,7 +4486,7 @@
           </a:lstStyle>
           <a:p>
             <a:r>
-              <a:rPr lang="en-US"/>
+              <a:rPr lang="en-US" smtClean="0"/>
               <a:t>Click icon to add picture</a:t>
             </a:r>
             <a:endParaRPr lang="en-US" dirty="0"/>
@@ -4536,32 +4554,9 @@
           <a:p>
             <a:pPr lvl="0"/>
             <a:r>
-              <a:rPr lang="en-US"/>
-              <a:t>Click to edit Master text styles</a:t>
-            </a:r>
-          </a:p>
-        </p:txBody>
-      </p:sp>
-      <p:sp>
-        <p:nvSpPr>
-          <p:cNvPr id="5" name="Date Placeholder 4"/>
-          <p:cNvSpPr>
-            <a:spLocks noGrp="1"/>
-          </p:cNvSpPr>
-          <p:nvPr>
-            <p:ph type="dt" sz="half" idx="10"/>
-          </p:nvPr>
-        </p:nvSpPr>
-        <p:spPr/>
-        <p:txBody>
-          <a:bodyPr/>
-          <a:lstStyle/>
-          <a:p>
-            <a:fld id="{EA6F526D-4AFC-4508-9DBC-E9D120CA701E}" type="datetimeFigureOut">
-              <a:rPr lang="en-IN" smtClean="0"/>
-              <a:t>23-03-2024</a:t>
-            </a:fld>
-            <a:endParaRPr lang="en-IN"/>
+              <a:rPr lang="en-US" smtClean="0"/>
+              <a:t>Edit Master text styles</a:t>
+            </a:r>
           </a:p>
         </p:txBody>
       </p:sp>
@@ -4607,10 +4602,33 @@
           </a:p>
         </p:txBody>
       </p:sp>
+      <p:sp>
+        <p:nvSpPr>
+          <p:cNvPr id="5" name="Date Placeholder 4"/>
+          <p:cNvSpPr>
+            <a:spLocks noGrp="1"/>
+          </p:cNvSpPr>
+          <p:nvPr>
+            <p:ph type="dt" sz="half" idx="10"/>
+          </p:nvPr>
+        </p:nvSpPr>
+        <p:spPr/>
+        <p:txBody>
+          <a:bodyPr/>
+          <a:lstStyle/>
+          <a:p>
+            <a:fld id="{EA6F526D-4AFC-4508-9DBC-E9D120CA701E}" type="datetimeFigureOut">
+              <a:rPr lang="en-IN" smtClean="0"/>
+              <a:t>24-03-2024</a:t>
+            </a:fld>
+            <a:endParaRPr lang="en-IN"/>
+          </a:p>
+        </p:txBody>
+      </p:sp>
     </p:spTree>
     <p:extLst>
       <p:ext uri="{BB962C8B-B14F-4D97-AF65-F5344CB8AC3E}">
-        <p14:creationId xmlns:p14="http://schemas.microsoft.com/office/powerpoint/2010/main" val="4282159045"/>
+        <p14:creationId xmlns:p14="http://schemas.microsoft.com/office/powerpoint/2010/main" val="634730972"/>
       </p:ext>
     </p:extLst>
   </p:cSld>
@@ -4644,7 +4662,7 @@
       </p:grpSpPr>
       <p:grpSp>
         <p:nvGrpSpPr>
-          <p:cNvPr id="7" name="Group 6"/>
+          <p:cNvPr id="44" name="Group 43"/>
           <p:cNvGrpSpPr/>
           <p:nvPr/>
         </p:nvGrpSpPr>
@@ -4672,8 +4690,8 @@
             </a:prstGeom>
             <a:ln w="9525">
               <a:solidFill>
-                <a:schemeClr val="bg1">
-                  <a:lumMod val="75000"/>
+                <a:schemeClr val="accent1">
+                  <a:alpha val="70000"/>
                 </a:schemeClr>
               </a:solidFill>
             </a:ln>
@@ -4709,8 +4727,8 @@
             </a:prstGeom>
             <a:ln w="9525">
               <a:solidFill>
-                <a:schemeClr val="bg1">
-                  <a:lumMod val="85000"/>
+                <a:schemeClr val="accent1">
+                  <a:alpha val="70000"/>
                 </a:schemeClr>
               </a:solidFill>
             </a:ln>
@@ -4770,7 +4788,7 @@
             </a:custGeom>
             <a:solidFill>
               <a:schemeClr val="accent1">
-                <a:alpha val="30000"/>
+                <a:alpha val="36000"/>
               </a:schemeClr>
             </a:solidFill>
             <a:ln>
@@ -4873,8 +4891,9 @@
               </a:avLst>
             </a:prstGeom>
             <a:solidFill>
-              <a:schemeClr val="accent2">
-                <a:alpha val="72000"/>
+              <a:schemeClr val="accent1">
+                <a:lumMod val="75000"/>
+                <a:alpha val="66000"/>
               </a:schemeClr>
             </a:solidFill>
             <a:ln>
@@ -4936,9 +4955,9 @@
               </a:pathLst>
             </a:custGeom>
             <a:solidFill>
-              <a:schemeClr val="accent2">
+              <a:schemeClr val="accent1">
                 <a:lumMod val="75000"/>
-                <a:alpha val="70000"/>
+                <a:alpha val="50000"/>
               </a:schemeClr>
             </a:solidFill>
             <a:ln>
@@ -5000,9 +5019,7 @@
               </a:pathLst>
             </a:custGeom>
             <a:solidFill>
-              <a:schemeClr val="accent1">
-                <a:lumMod val="60000"/>
-                <a:lumOff val="40000"/>
+              <a:schemeClr val="accent2">
                 <a:alpha val="70000"/>
               </a:schemeClr>
             </a:solidFill>
@@ -5065,8 +5082,9 @@
               </a:pathLst>
             </a:custGeom>
             <a:solidFill>
-              <a:schemeClr val="accent1">
-                <a:alpha val="65000"/>
+              <a:schemeClr val="accent2">
+                <a:lumMod val="75000"/>
+                <a:alpha val="80000"/>
               </a:schemeClr>
             </a:solidFill>
             <a:ln>
@@ -5107,7 +5125,8 @@
             </a:prstGeom>
             <a:solidFill>
               <a:schemeClr val="accent1">
-                <a:alpha val="80000"/>
+                <a:lumMod val="75000"/>
+                <a:alpha val="66000"/>
               </a:schemeClr>
             </a:solidFill>
             <a:ln>
@@ -5132,7 +5151,7 @@
         </p:sp>
         <p:sp>
           <p:nvSpPr>
-            <p:cNvPr id="29" name="Isosceles Triangle 28"/>
+            <p:cNvPr id="19" name="Isosceles Triangle 18"/>
             <p:cNvSpPr/>
             <p:nvPr/>
           </p:nvSpPr>
@@ -5148,7 +5167,7 @@
             </a:prstGeom>
             <a:solidFill>
               <a:schemeClr val="accent1">
-                <a:alpha val="85000"/>
+                <a:alpha val="70000"/>
               </a:schemeClr>
             </a:solidFill>
             <a:ln>
@@ -5198,7 +5217,7 @@
           <a:lstStyle/>
           <a:p>
             <a:r>
-              <a:rPr lang="en-US"/>
+              <a:rPr lang="en-US" smtClean="0"/>
               <a:t>Click to edit Master title style</a:t>
             </a:r>
             <a:endParaRPr lang="en-US" dirty="0"/>
@@ -5232,35 +5251,35 @@
           <a:p>
             <a:pPr lvl="0"/>
             <a:r>
-              <a:rPr lang="en-US"/>
-              <a:t>Click to edit Master text styles</a:t>
+              <a:rPr lang="en-US" smtClean="0"/>
+              <a:t>Edit Master text styles</a:t>
             </a:r>
           </a:p>
           <a:p>
             <a:pPr lvl="1"/>
             <a:r>
-              <a:rPr lang="en-US"/>
+              <a:rPr lang="en-US" smtClean="0"/>
               <a:t>Second level</a:t>
             </a:r>
           </a:p>
           <a:p>
             <a:pPr lvl="2"/>
             <a:r>
-              <a:rPr lang="en-US"/>
+              <a:rPr lang="en-US" smtClean="0"/>
               <a:t>Third level</a:t>
             </a:r>
           </a:p>
           <a:p>
             <a:pPr lvl="3"/>
             <a:r>
-              <a:rPr lang="en-US"/>
+              <a:rPr lang="en-US" smtClean="0"/>
               <a:t>Fourth level</a:t>
             </a:r>
           </a:p>
           <a:p>
             <a:pPr lvl="4"/>
             <a:r>
-              <a:rPr lang="en-US"/>
+              <a:rPr lang="en-US" smtClean="0"/>
               <a:t>Fifth level</a:t>
             </a:r>
             <a:endParaRPr lang="en-US" dirty="0"/>
@@ -5302,7 +5321,7 @@
           <a:p>
             <a:fld id="{EA6F526D-4AFC-4508-9DBC-E9D120CA701E}" type="datetimeFigureOut">
               <a:rPr lang="en-IN" smtClean="0"/>
-              <a:t>23-03-2024</a:t>
+              <a:t>24-03-2024</a:t>
             </a:fld>
             <a:endParaRPr lang="en-IN"/>
           </a:p>
@@ -5387,28 +5406,28 @@
     </p:spTree>
     <p:extLst>
       <p:ext uri="{BB962C8B-B14F-4D97-AF65-F5344CB8AC3E}">
-        <p14:creationId xmlns:p14="http://schemas.microsoft.com/office/powerpoint/2010/main" val="1555866437"/>
+        <p14:creationId xmlns:p14="http://schemas.microsoft.com/office/powerpoint/2010/main" val="3251901633"/>
       </p:ext>
     </p:extLst>
   </p:cSld>
   <p:clrMap bg1="lt1" tx1="dk1" bg2="lt2" tx2="dk2" accent1="accent1" accent2="accent2" accent3="accent3" accent4="accent4" accent5="accent5" accent6="accent6" hlink="hlink" folHlink="folHlink"/>
   <p:sldLayoutIdLst>
-    <p:sldLayoutId id="2147483661" r:id="rId1"/>
-    <p:sldLayoutId id="2147483662" r:id="rId2"/>
-    <p:sldLayoutId id="2147483663" r:id="rId3"/>
-    <p:sldLayoutId id="2147483664" r:id="rId4"/>
-    <p:sldLayoutId id="2147483665" r:id="rId5"/>
-    <p:sldLayoutId id="2147483666" r:id="rId6"/>
-    <p:sldLayoutId id="2147483667" r:id="rId7"/>
-    <p:sldLayoutId id="2147483668" r:id="rId8"/>
-    <p:sldLayoutId id="2147483669" r:id="rId9"/>
-    <p:sldLayoutId id="2147483670" r:id="rId10"/>
-    <p:sldLayoutId id="2147483671" r:id="rId11"/>
-    <p:sldLayoutId id="2147483672" r:id="rId12"/>
-    <p:sldLayoutId id="2147483673" r:id="rId13"/>
-    <p:sldLayoutId id="2147483674" r:id="rId14"/>
-    <p:sldLayoutId id="2147483675" r:id="rId15"/>
-    <p:sldLayoutId id="2147483676" r:id="rId16"/>
+    <p:sldLayoutId id="2147483678" r:id="rId1"/>
+    <p:sldLayoutId id="2147483679" r:id="rId2"/>
+    <p:sldLayoutId id="2147483680" r:id="rId3"/>
+    <p:sldLayoutId id="2147483681" r:id="rId4"/>
+    <p:sldLayoutId id="2147483682" r:id="rId5"/>
+    <p:sldLayoutId id="2147483683" r:id="rId6"/>
+    <p:sldLayoutId id="2147483684" r:id="rId7"/>
+    <p:sldLayoutId id="2147483685" r:id="rId8"/>
+    <p:sldLayoutId id="2147483686" r:id="rId9"/>
+    <p:sldLayoutId id="2147483687" r:id="rId10"/>
+    <p:sldLayoutId id="2147483688" r:id="rId11"/>
+    <p:sldLayoutId id="2147483689" r:id="rId12"/>
+    <p:sldLayoutId id="2147483690" r:id="rId13"/>
+    <p:sldLayoutId id="2147483691" r:id="rId14"/>
+    <p:sldLayoutId id="2147483692" r:id="rId15"/>
+    <p:sldLayoutId id="2147483693" r:id="rId16"/>
   </p:sldLayoutIdLst>
   <p:txStyles>
     <p:titleStyle>
@@ -5849,7 +5868,9 @@
           <a:p>
             <a:pPr algn="l"/>
             <a:r>
-              <a:rPr lang="en-IN" sz="7200" dirty="0"/>
+              <a:rPr lang="en-IN" sz="8800" b="1" dirty="0">
+                <a:latin typeface="Arial Black" panose="020B0A04020102020204" pitchFamily="34" charset="0"/>
+              </a:rPr>
               <a:t>Sales Forecasting </a:t>
             </a:r>
           </a:p>
@@ -5885,50 +5906,77 @@
           <a:p>
             <a:pPr algn="l"/>
             <a:r>
-              <a:rPr lang="en-IN" dirty="0"/>
+              <a:rPr lang="en-IN" dirty="0">
+                <a:latin typeface="Arial Black" panose="020B0A04020102020204" pitchFamily="34" charset="0"/>
+                <a:cs typeface="Arial" panose="020B0604020202020204" pitchFamily="34" charset="0"/>
+              </a:rPr>
               <a:t>By</a:t>
             </a:r>
           </a:p>
           <a:p>
             <a:pPr algn="l"/>
             <a:r>
-              <a:rPr lang="en-IN" dirty="0"/>
+              <a:rPr lang="en-IN" dirty="0">
+                <a:latin typeface="Arial" panose="020B0604020202020204" pitchFamily="34" charset="0"/>
+                <a:cs typeface="Arial" panose="020B0604020202020204" pitchFamily="34" charset="0"/>
+              </a:rPr>
               <a:t>Umer Mujawar</a:t>
             </a:r>
           </a:p>
           <a:p>
             <a:pPr algn="l"/>
             <a:r>
-              <a:rPr lang="en-IN" dirty="0"/>
+              <a:rPr lang="en-IN" dirty="0">
+                <a:latin typeface="Arial" panose="020B0604020202020204" pitchFamily="34" charset="0"/>
+                <a:cs typeface="Arial" panose="020B0604020202020204" pitchFamily="34" charset="0"/>
+              </a:rPr>
               <a:t>Amit Patil </a:t>
             </a:r>
           </a:p>
           <a:p>
             <a:pPr algn="l"/>
             <a:r>
-              <a:rPr lang="en-IN" dirty="0" err="1"/>
+              <a:rPr lang="en-IN" dirty="0" err="1">
+                <a:latin typeface="Arial" panose="020B0604020202020204" pitchFamily="34" charset="0"/>
+                <a:cs typeface="Arial" panose="020B0604020202020204" pitchFamily="34" charset="0"/>
+              </a:rPr>
               <a:t>Rushikesh</a:t>
             </a:r>
             <a:r>
-              <a:rPr lang="en-IN" dirty="0"/>
+              <a:rPr lang="en-IN" dirty="0">
+                <a:latin typeface="Arial" panose="020B0604020202020204" pitchFamily="34" charset="0"/>
+                <a:cs typeface="Arial" panose="020B0604020202020204" pitchFamily="34" charset="0"/>
+              </a:rPr>
               <a:t> Kate</a:t>
             </a:r>
           </a:p>
           <a:p>
             <a:pPr algn="l"/>
             <a:r>
-              <a:rPr lang="en-IN" dirty="0"/>
+              <a:rPr lang="en-IN" dirty="0">
+                <a:latin typeface="Arial" panose="020B0604020202020204" pitchFamily="34" charset="0"/>
+                <a:cs typeface="Arial" panose="020B0604020202020204" pitchFamily="34" charset="0"/>
+              </a:rPr>
               <a:t>Laxmi </a:t>
             </a:r>
             <a:r>
-              <a:rPr lang="en-IN" dirty="0" err="1"/>
+              <a:rPr lang="en-IN" dirty="0" err="1">
+                <a:latin typeface="Arial" panose="020B0604020202020204" pitchFamily="34" charset="0"/>
+                <a:cs typeface="Arial" panose="020B0604020202020204" pitchFamily="34" charset="0"/>
+              </a:rPr>
               <a:t>Wandare</a:t>
             </a:r>
-            <a:endParaRPr lang="en-IN" dirty="0"/>
+            <a:endParaRPr lang="en-IN" dirty="0">
+              <a:latin typeface="Arial" panose="020B0604020202020204" pitchFamily="34" charset="0"/>
+              <a:cs typeface="Arial" panose="020B0604020202020204" pitchFamily="34" charset="0"/>
+            </a:endParaRPr>
           </a:p>
           <a:p>
             <a:pPr algn="l"/>
-            <a:endParaRPr lang="en-IN" dirty="0"/>
+            <a:endParaRPr lang="en-IN" dirty="0">
+              <a:latin typeface="Arial" panose="020B0604020202020204" pitchFamily="34" charset="0"/>
+              <a:cs typeface="Arial" panose="020B0604020202020204" pitchFamily="34" charset="0"/>
+            </a:endParaRPr>
           </a:p>
         </p:txBody>
       </p:sp>
@@ -5942,6 +5990,13 @@
   <p:clrMapOvr>
     <a:masterClrMapping/>
   </p:clrMapOvr>
+  <p:timing>
+    <p:tnLst>
+      <p:par>
+        <p:cTn id="1" dur="indefinite" restart="never" nodeType="tmRoot"/>
+      </p:par>
+    </p:tnLst>
+  </p:timing>
 </p:sld>
 </file>
 
@@ -5991,34 +6046,58 @@
           <a:lstStyle/>
           <a:p>
             <a:r>
+              <a:rPr lang="en-IN" b="1" dirty="0" smtClean="0">
+                <a:latin typeface="Arial Black" panose="020B0A04020102020204" pitchFamily="34" charset="0"/>
+              </a:rPr>
+              <a:t>Problem Statement – </a:t>
+            </a:r>
+            <a:br>
+              <a:rPr lang="en-IN" b="1" dirty="0" smtClean="0">
+                <a:latin typeface="Arial Black" panose="020B0A04020102020204" pitchFamily="34" charset="0"/>
+              </a:rPr>
+            </a:br>
+            <a:r>
               <a:rPr lang="en-IN" dirty="0"/>
-              <a:t>Problem Statement – </a:t>
+              <a:t/>
             </a:r>
             <a:br>
               <a:rPr lang="en-IN" dirty="0"/>
             </a:br>
-            <a:br>
-              <a:rPr lang="en-IN" dirty="0"/>
-            </a:br>
-            <a:r>
-              <a:rPr lang="en-IN" sz="2800" dirty="0">
+            <a:r>
+              <a:rPr lang="en-IN" sz="2800" b="1" dirty="0">
                 <a:solidFill>
                   <a:schemeClr val="accent5">
                     <a:lumMod val="50000"/>
                   </a:schemeClr>
                 </a:solidFill>
+                <a:latin typeface="Arial" panose="020B0604020202020204" pitchFamily="34" charset="0"/>
+                <a:cs typeface="Arial" panose="020B0604020202020204" pitchFamily="34" charset="0"/>
               </a:rPr>
               <a:t>Build a Predictive Model </a:t>
             </a:r>
             <a:br>
-              <a:rPr lang="en-IN" sz="2800" dirty="0">
+              <a:rPr lang="en-IN" sz="2800" b="1" dirty="0">
                 <a:solidFill>
                   <a:schemeClr val="accent5">
                     <a:lumMod val="50000"/>
                   </a:schemeClr>
                 </a:solidFill>
+                <a:latin typeface="Arial" panose="020B0604020202020204" pitchFamily="34" charset="0"/>
+                <a:cs typeface="Arial" panose="020B0604020202020204" pitchFamily="34" charset="0"/>
               </a:rPr>
             </a:br>
+            <a:r>
+              <a:rPr lang="en-IN" sz="2800" dirty="0">
+                <a:solidFill>
+                  <a:schemeClr val="accent5">
+                    <a:lumMod val="50000"/>
+                  </a:schemeClr>
+                </a:solidFill>
+                <a:latin typeface="Arial" panose="020B0604020202020204" pitchFamily="34" charset="0"/>
+                <a:cs typeface="Arial" panose="020B0604020202020204" pitchFamily="34" charset="0"/>
+              </a:rPr>
+              <a:t/>
+            </a:r>
             <a:br>
               <a:rPr lang="en-IN" sz="2800" dirty="0">
                 <a:solidFill>
@@ -6026,8 +6105,22 @@
                     <a:lumMod val="50000"/>
                   </a:schemeClr>
                 </a:solidFill>
+                <a:latin typeface="Arial" panose="020B0604020202020204" pitchFamily="34" charset="0"/>
+                <a:cs typeface="Arial" panose="020B0604020202020204" pitchFamily="34" charset="0"/>
               </a:rPr>
             </a:br>
+            <a:r>
+              <a:rPr lang="en-IN" sz="2800" dirty="0">
+                <a:solidFill>
+                  <a:schemeClr val="accent5">
+                    <a:lumMod val="50000"/>
+                  </a:schemeClr>
+                </a:solidFill>
+                <a:latin typeface="Arial" panose="020B0604020202020204" pitchFamily="34" charset="0"/>
+                <a:cs typeface="Arial" panose="020B0604020202020204" pitchFamily="34" charset="0"/>
+              </a:rPr>
+              <a:t/>
+            </a:r>
             <a:br>
               <a:rPr lang="en-IN" sz="2800" dirty="0">
                 <a:solidFill>
@@ -6035,6 +6128,8 @@
                     <a:lumMod val="50000"/>
                   </a:schemeClr>
                 </a:solidFill>
+                <a:latin typeface="Arial" panose="020B0604020202020204" pitchFamily="34" charset="0"/>
+                <a:cs typeface="Arial" panose="020B0604020202020204" pitchFamily="34" charset="0"/>
               </a:rPr>
             </a:br>
             <a:r>
@@ -6044,6 +6139,8 @@
                     <a:lumMod val="50000"/>
                   </a:schemeClr>
                 </a:solidFill>
+                <a:latin typeface="Arial" panose="020B0604020202020204" pitchFamily="34" charset="0"/>
+                <a:cs typeface="Arial" panose="020B0604020202020204" pitchFamily="34" charset="0"/>
               </a:rPr>
               <a:t>Forecast future sales based on historical Data</a:t>
             </a:r>
@@ -6054,6 +6151,8 @@
                     <a:lumMod val="50000"/>
                   </a:schemeClr>
                 </a:solidFill>
+                <a:latin typeface="Arial" panose="020B0604020202020204" pitchFamily="34" charset="0"/>
+                <a:cs typeface="Arial" panose="020B0604020202020204" pitchFamily="34" charset="0"/>
               </a:rPr>
             </a:br>
             <a:r>
@@ -6063,8 +6162,34 @@
                     <a:lumMod val="50000"/>
                   </a:schemeClr>
                 </a:solidFill>
+                <a:latin typeface="Arial" panose="020B0604020202020204" pitchFamily="34" charset="0"/>
+                <a:cs typeface="Arial" panose="020B0604020202020204" pitchFamily="34" charset="0"/>
               </a:rPr>
-              <a:t>- Seasonal Trends </a:t>
+              <a:t>- </a:t>
+            </a:r>
+            <a:r>
+              <a:rPr lang="en-IN" sz="2800" b="1" dirty="0">
+                <a:solidFill>
+                  <a:schemeClr val="accent5">
+                    <a:lumMod val="50000"/>
+                  </a:schemeClr>
+                </a:solidFill>
+                <a:latin typeface="Arial" panose="020B0604020202020204" pitchFamily="34" charset="0"/>
+                <a:cs typeface="Arial" panose="020B0604020202020204" pitchFamily="34" charset="0"/>
+              </a:rPr>
+              <a:t>Seasonal Trends </a:t>
+            </a:r>
+            <a:r>
+              <a:rPr lang="en-IN" sz="2800" dirty="0">
+                <a:solidFill>
+                  <a:schemeClr val="accent5">
+                    <a:lumMod val="50000"/>
+                  </a:schemeClr>
+                </a:solidFill>
+                <a:latin typeface="Arial" panose="020B0604020202020204" pitchFamily="34" charset="0"/>
+                <a:cs typeface="Arial" panose="020B0604020202020204" pitchFamily="34" charset="0"/>
+              </a:rPr>
+              <a:t/>
             </a:r>
             <a:br>
               <a:rPr lang="en-IN" sz="2800" dirty="0">
@@ -6073,6 +6198,8 @@
                     <a:lumMod val="50000"/>
                   </a:schemeClr>
                 </a:solidFill>
+                <a:latin typeface="Arial" panose="020B0604020202020204" pitchFamily="34" charset="0"/>
+                <a:cs typeface="Arial" panose="020B0604020202020204" pitchFamily="34" charset="0"/>
               </a:rPr>
             </a:br>
             <a:r>
@@ -6082,6 +6209,8 @@
                     <a:lumMod val="50000"/>
                   </a:schemeClr>
                 </a:solidFill>
+                <a:latin typeface="Arial" panose="020B0604020202020204" pitchFamily="34" charset="0"/>
+                <a:cs typeface="Arial" panose="020B0604020202020204" pitchFamily="34" charset="0"/>
               </a:rPr>
               <a:t>- Promotional Activities</a:t>
             </a:r>
@@ -6092,6 +6221,8 @@
                     <a:lumMod val="50000"/>
                   </a:schemeClr>
                 </a:solidFill>
+                <a:latin typeface="Arial" panose="020B0604020202020204" pitchFamily="34" charset="0"/>
+                <a:cs typeface="Arial" panose="020B0604020202020204" pitchFamily="34" charset="0"/>
               </a:rPr>
             </a:br>
             <a:r>
@@ -6101,8 +6232,34 @@
                     <a:lumMod val="50000"/>
                   </a:schemeClr>
                 </a:solidFill>
+                <a:latin typeface="Arial" panose="020B0604020202020204" pitchFamily="34" charset="0"/>
+                <a:cs typeface="Arial" panose="020B0604020202020204" pitchFamily="34" charset="0"/>
               </a:rPr>
-              <a:t>- Other Relevant Factor </a:t>
+              <a:t>- </a:t>
+            </a:r>
+            <a:r>
+              <a:rPr lang="en-IN" sz="2800" b="1" dirty="0">
+                <a:solidFill>
+                  <a:schemeClr val="accent5">
+                    <a:lumMod val="50000"/>
+                  </a:schemeClr>
+                </a:solidFill>
+                <a:latin typeface="Arial" panose="020B0604020202020204" pitchFamily="34" charset="0"/>
+                <a:cs typeface="Arial" panose="020B0604020202020204" pitchFamily="34" charset="0"/>
+              </a:rPr>
+              <a:t>Other Relevant Factor </a:t>
+            </a:r>
+            <a:r>
+              <a:rPr lang="en-IN" sz="2800" dirty="0">
+                <a:solidFill>
+                  <a:schemeClr val="accent5">
+                    <a:lumMod val="50000"/>
+                  </a:schemeClr>
+                </a:solidFill>
+                <a:latin typeface="Arial" panose="020B0604020202020204" pitchFamily="34" charset="0"/>
+                <a:cs typeface="Arial" panose="020B0604020202020204" pitchFamily="34" charset="0"/>
+              </a:rPr>
+              <a:t/>
             </a:r>
             <a:br>
               <a:rPr lang="en-IN" sz="2800" dirty="0">
@@ -6111,6 +6268,8 @@
                     <a:lumMod val="50000"/>
                   </a:schemeClr>
                 </a:solidFill>
+                <a:latin typeface="Arial" panose="020B0604020202020204" pitchFamily="34" charset="0"/>
+                <a:cs typeface="Arial" panose="020B0604020202020204" pitchFamily="34" charset="0"/>
               </a:rPr>
             </a:br>
             <a:r>
@@ -6120,6 +6279,8 @@
                     <a:lumMod val="50000"/>
                   </a:schemeClr>
                 </a:solidFill>
+                <a:latin typeface="Arial" panose="020B0604020202020204" pitchFamily="34" charset="0"/>
+                <a:cs typeface="Arial" panose="020B0604020202020204" pitchFamily="34" charset="0"/>
               </a:rPr>
               <a:t>This can help Businesses Optimize Their Inventory Management and Resource Allocation </a:t>
             </a:r>
@@ -6129,6 +6290,8 @@
                   <a:lumMod val="50000"/>
                 </a:schemeClr>
               </a:solidFill>
+              <a:latin typeface="Arial" panose="020B0604020202020204" pitchFamily="34" charset="0"/>
+              <a:cs typeface="Arial" panose="020B0604020202020204" pitchFamily="34" charset="0"/>
             </a:endParaRPr>
           </a:p>
         </p:txBody>
@@ -6143,10 +6306,964 @@
   <p:clrMapOvr>
     <a:masterClrMapping/>
   </p:clrMapOvr>
+  <p:timing>
+    <p:tnLst>
+      <p:par>
+        <p:cTn id="1" dur="indefinite" restart="never" nodeType="tmRoot"/>
+      </p:par>
+    </p:tnLst>
+  </p:timing>
 </p:sld>
 </file>
 
 <file path=ppt/slides/slide3.xml><?xml version="1.0" encoding="utf-8"?>
+<p:sld xmlns:a="http://schemas.openxmlformats.org/drawingml/2006/main" xmlns:r="http://schemas.openxmlformats.org/officeDocument/2006/relationships" xmlns:p="http://schemas.openxmlformats.org/presentationml/2006/main">
+  <p:cSld>
+    <p:spTree>
+      <p:nvGrpSpPr>
+        <p:cNvPr id="1" name=""/>
+        <p:cNvGrpSpPr/>
+        <p:nvPr/>
+      </p:nvGrpSpPr>
+      <p:grpSpPr>
+        <a:xfrm>
+          <a:off x="0" y="0"/>
+          <a:ext cx="0" cy="0"/>
+          <a:chOff x="0" y="0"/>
+          <a:chExt cx="0" cy="0"/>
+        </a:xfrm>
+      </p:grpSpPr>
+      <p:pic>
+        <p:nvPicPr>
+          <p:cNvPr id="2" name="Picture 1"/>
+          <p:cNvPicPr>
+            <a:picLocks noChangeAspect="1"/>
+          </p:cNvPicPr>
+          <p:nvPr/>
+        </p:nvPicPr>
+        <p:blipFill>
+          <a:blip r:embed="rId2">
+            <a:extLst>
+              <a:ext uri="{BEBA8EAE-BF5A-486C-A8C5-ECC9F3942E4B}">
+                <a14:imgProps xmlns:a14="http://schemas.microsoft.com/office/drawing/2010/main">
+                  <a14:imgLayer r:embed="rId3">
+                    <a14:imgEffect>
+                      <a14:backgroundRemoval t="0" b="100000" l="0" r="100000">
+                        <a14:foregroundMark x1="30472" y1="18710" x2="73391" y2="18710"/>
+                        <a14:foregroundMark x1="28970" y1="57097" x2="73391" y2="57419"/>
+                        <a14:foregroundMark x1="28541" y1="72581" x2="73391" y2="73871"/>
+                        <a14:foregroundMark x1="29185" y1="95806" x2="73391" y2="93548"/>
+                        <a14:foregroundMark x1="46781" y1="32903" x2="46781" y2="32903"/>
+                        <a14:backgroundMark x1="37554" y1="34839" x2="37554" y2="34839"/>
+                        <a14:backgroundMark x1="38627" y1="48710" x2="38627" y2="48710"/>
+                        <a14:backgroundMark x1="38412" y1="57419" x2="38412" y2="57419"/>
+                      </a14:backgroundRemoval>
+                    </a14:imgEffect>
+                  </a14:imgLayer>
+                </a14:imgProps>
+              </a:ext>
+            </a:extLst>
+          </a:blip>
+          <a:stretch>
+            <a:fillRect/>
+          </a:stretch>
+        </p:blipFill>
+        <p:spPr>
+          <a:xfrm>
+            <a:off x="940526" y="1265615"/>
+            <a:ext cx="8131707" cy="5409505"/>
+          </a:xfrm>
+          <a:prstGeom prst="rect">
+            <a:avLst/>
+          </a:prstGeom>
+          <a:effectLst>
+            <a:innerShdw blurRad="63500" dist="50800" dir="16200000">
+              <a:prstClr val="black">
+                <a:alpha val="50000"/>
+              </a:prstClr>
+            </a:innerShdw>
+          </a:effectLst>
+        </p:spPr>
+      </p:pic>
+      <p:sp>
+        <p:nvSpPr>
+          <p:cNvPr id="3" name="TextBox 2"/>
+          <p:cNvSpPr txBox="1"/>
+          <p:nvPr/>
+        </p:nvSpPr>
+        <p:spPr>
+          <a:xfrm>
+            <a:off x="1894114" y="404948"/>
+            <a:ext cx="7178119" cy="707886"/>
+          </a:xfrm>
+          <a:prstGeom prst="rect">
+            <a:avLst/>
+          </a:prstGeom>
+          <a:noFill/>
+        </p:spPr>
+        <p:txBody>
+          <a:bodyPr wrap="none" rtlCol="0">
+            <a:spAutoFit/>
+          </a:bodyPr>
+          <a:lstStyle/>
+          <a:p>
+            <a:r>
+              <a:rPr lang="en-US" sz="4000" dirty="0" smtClean="0">
+                <a:solidFill>
+                  <a:schemeClr val="accent1">
+                    <a:lumMod val="75000"/>
+                  </a:schemeClr>
+                </a:solidFill>
+                <a:latin typeface="Arial Black" panose="020B0A04020102020204" pitchFamily="34" charset="0"/>
+              </a:rPr>
+              <a:t>Factor Influencing Sales </a:t>
+            </a:r>
+            <a:endParaRPr lang="en-IN" sz="4000" dirty="0">
+              <a:solidFill>
+                <a:schemeClr val="accent1">
+                  <a:lumMod val="75000"/>
+                </a:schemeClr>
+              </a:solidFill>
+              <a:latin typeface="Arial Black" panose="020B0A04020102020204" pitchFamily="34" charset="0"/>
+            </a:endParaRPr>
+          </a:p>
+        </p:txBody>
+      </p:sp>
+    </p:spTree>
+    <p:extLst>
+      <p:ext uri="{BB962C8B-B14F-4D97-AF65-F5344CB8AC3E}">
+        <p14:creationId xmlns:p14="http://schemas.microsoft.com/office/powerpoint/2010/main" val="2332273217"/>
+      </p:ext>
+    </p:extLst>
+  </p:cSld>
+  <p:clrMapOvr>
+    <a:masterClrMapping/>
+  </p:clrMapOvr>
+  <p:timing>
+    <p:tnLst>
+      <p:par>
+        <p:cTn id="1" dur="indefinite" restart="never" nodeType="tmRoot"/>
+      </p:par>
+    </p:tnLst>
+  </p:timing>
+</p:sld>
+</file>
+
+<file path=ppt/slides/slide4.xml><?xml version="1.0" encoding="utf-8"?>
+<p:sld xmlns:a="http://schemas.openxmlformats.org/drawingml/2006/main" xmlns:r="http://schemas.openxmlformats.org/officeDocument/2006/relationships" xmlns:p="http://schemas.openxmlformats.org/presentationml/2006/main">
+  <p:cSld>
+    <p:spTree>
+      <p:nvGrpSpPr>
+        <p:cNvPr id="1" name=""/>
+        <p:cNvGrpSpPr/>
+        <p:nvPr/>
+      </p:nvGrpSpPr>
+      <p:grpSpPr>
+        <a:xfrm>
+          <a:off x="0" y="0"/>
+          <a:ext cx="0" cy="0"/>
+          <a:chOff x="0" y="0"/>
+          <a:chExt cx="0" cy="0"/>
+        </a:xfrm>
+      </p:grpSpPr>
+      <p:sp>
+        <p:nvSpPr>
+          <p:cNvPr id="2" name="Title 1"/>
+          <p:cNvSpPr>
+            <a:spLocks noGrp="1"/>
+          </p:cNvSpPr>
+          <p:nvPr>
+            <p:ph type="title"/>
+          </p:nvPr>
+        </p:nvSpPr>
+        <p:spPr>
+          <a:xfrm>
+            <a:off x="677335" y="809897"/>
+            <a:ext cx="8596668" cy="882906"/>
+          </a:xfrm>
+        </p:spPr>
+        <p:txBody>
+          <a:bodyPr>
+            <a:normAutofit/>
+          </a:bodyPr>
+          <a:lstStyle/>
+          <a:p>
+            <a:r>
+              <a:rPr lang="en-US" sz="4400" dirty="0" smtClean="0">
+                <a:latin typeface="Arial Black" panose="020B0A04020102020204" pitchFamily="34" charset="0"/>
+              </a:rPr>
+              <a:t>What is Different In Us ? </a:t>
+            </a:r>
+            <a:endParaRPr lang="en-IN" sz="4400" dirty="0">
+              <a:latin typeface="Arial Black" panose="020B0A04020102020204" pitchFamily="34" charset="0"/>
+            </a:endParaRPr>
+          </a:p>
+        </p:txBody>
+      </p:sp>
+      <p:sp>
+        <p:nvSpPr>
+          <p:cNvPr id="3" name="Text Placeholder 2"/>
+          <p:cNvSpPr>
+            <a:spLocks noGrp="1"/>
+          </p:cNvSpPr>
+          <p:nvPr>
+            <p:ph type="body" idx="1"/>
+          </p:nvPr>
+        </p:nvSpPr>
+        <p:spPr>
+          <a:xfrm>
+            <a:off x="677335" y="2116183"/>
+            <a:ext cx="8596668" cy="3271665"/>
+          </a:xfrm>
+        </p:spPr>
+        <p:txBody>
+          <a:bodyPr>
+            <a:normAutofit/>
+          </a:bodyPr>
+          <a:lstStyle/>
+          <a:p>
+            <a:pPr marL="457200" indent="-457200">
+              <a:buFont typeface="Wingdings" panose="05000000000000000000" pitchFamily="2" charset="2"/>
+              <a:buChar char="ü"/>
+            </a:pPr>
+            <a:r>
+              <a:rPr lang="en-US" sz="2800" dirty="0" smtClean="0">
+                <a:solidFill>
+                  <a:schemeClr val="tx1"/>
+                </a:solidFill>
+                <a:latin typeface="Arial" panose="020B0604020202020204" pitchFamily="34" charset="0"/>
+                <a:cs typeface="Arial" panose="020B0604020202020204" pitchFamily="34" charset="0"/>
+              </a:rPr>
+              <a:t>Anyone can use </a:t>
+            </a:r>
+          </a:p>
+          <a:p>
+            <a:pPr marL="457200" indent="-457200">
+              <a:buFont typeface="Wingdings" panose="05000000000000000000" pitchFamily="2" charset="2"/>
+              <a:buChar char="ü"/>
+            </a:pPr>
+            <a:r>
+              <a:rPr lang="en-US" sz="2800" dirty="0" smtClean="0">
+                <a:solidFill>
+                  <a:schemeClr val="tx1"/>
+                </a:solidFill>
+                <a:latin typeface="Arial" panose="020B0604020202020204" pitchFamily="34" charset="0"/>
+                <a:cs typeface="Arial" panose="020B0604020202020204" pitchFamily="34" charset="0"/>
+              </a:rPr>
+              <a:t>Generalized </a:t>
+            </a:r>
+          </a:p>
+          <a:p>
+            <a:pPr marL="457200" indent="-457200">
+              <a:buFont typeface="Wingdings" panose="05000000000000000000" pitchFamily="2" charset="2"/>
+              <a:buChar char="ü"/>
+            </a:pPr>
+            <a:r>
+              <a:rPr lang="en-US" sz="2800" dirty="0" smtClean="0">
+                <a:solidFill>
+                  <a:schemeClr val="tx1"/>
+                </a:solidFill>
+                <a:latin typeface="Arial" panose="020B0604020202020204" pitchFamily="34" charset="0"/>
+                <a:cs typeface="Arial" panose="020B0604020202020204" pitchFamily="34" charset="0"/>
+              </a:rPr>
+              <a:t>Easy to Use </a:t>
+            </a:r>
+          </a:p>
+          <a:p>
+            <a:pPr marL="457200" indent="-457200">
+              <a:buFont typeface="Wingdings" panose="05000000000000000000" pitchFamily="2" charset="2"/>
+              <a:buChar char="ü"/>
+            </a:pPr>
+            <a:r>
+              <a:rPr lang="en-US" sz="2800" dirty="0" smtClean="0">
+                <a:solidFill>
+                  <a:schemeClr val="tx1"/>
+                </a:solidFill>
+                <a:latin typeface="Arial" panose="020B0604020202020204" pitchFamily="34" charset="0"/>
+                <a:cs typeface="Arial" panose="020B0604020202020204" pitchFamily="34" charset="0"/>
+              </a:rPr>
+              <a:t>Any Normal Grocery owner or normal vendor Can Use it </a:t>
+            </a:r>
+          </a:p>
+          <a:p>
+            <a:pPr marL="457200" indent="-457200">
+              <a:buFont typeface="Wingdings" panose="05000000000000000000" pitchFamily="2" charset="2"/>
+              <a:buChar char="ü"/>
+            </a:pPr>
+            <a:endParaRPr lang="en-IN" sz="2800" dirty="0">
+              <a:solidFill>
+                <a:schemeClr val="tx1"/>
+              </a:solidFill>
+              <a:latin typeface="Arial" panose="020B0604020202020204" pitchFamily="34" charset="0"/>
+              <a:cs typeface="Arial" panose="020B0604020202020204" pitchFamily="34" charset="0"/>
+            </a:endParaRPr>
+          </a:p>
+        </p:txBody>
+      </p:sp>
+      <p:sp>
+        <p:nvSpPr>
+          <p:cNvPr id="4" name="Title 1"/>
+          <p:cNvSpPr txBox="1">
+            <a:spLocks/>
+          </p:cNvSpPr>
+          <p:nvPr/>
+        </p:nvSpPr>
+        <p:spPr>
+          <a:xfrm>
+            <a:off x="921175" y="4946395"/>
+            <a:ext cx="8596668" cy="882906"/>
+          </a:xfrm>
+          <a:prstGeom prst="rect">
+            <a:avLst/>
+          </a:prstGeom>
+        </p:spPr>
+        <p:txBody>
+          <a:bodyPr vert="horz" lIns="91440" tIns="45720" rIns="91440" bIns="45720" rtlCol="0" anchor="b">
+            <a:normAutofit/>
+          </a:bodyPr>
+          <a:lstStyle>
+            <a:lvl1pPr algn="l" defTabSz="457200" rtl="0" eaLnBrk="1" latinLnBrk="0" hangingPunct="1">
+              <a:spcBef>
+                <a:spcPct val="0"/>
+              </a:spcBef>
+              <a:buNone/>
+              <a:defRPr sz="4000" b="0" kern="1200" cap="none">
+                <a:solidFill>
+                  <a:schemeClr val="accent1"/>
+                </a:solidFill>
+                <a:latin typeface="+mj-lt"/>
+                <a:ea typeface="+mj-ea"/>
+                <a:cs typeface="+mj-cs"/>
+              </a:defRPr>
+            </a:lvl1pPr>
+            <a:lvl2pPr eaLnBrk="1" hangingPunct="1">
+              <a:defRPr>
+                <a:solidFill>
+                  <a:schemeClr val="tx2"/>
+                </a:solidFill>
+              </a:defRPr>
+            </a:lvl2pPr>
+            <a:lvl3pPr eaLnBrk="1" hangingPunct="1">
+              <a:defRPr>
+                <a:solidFill>
+                  <a:schemeClr val="tx2"/>
+                </a:solidFill>
+              </a:defRPr>
+            </a:lvl3pPr>
+            <a:lvl4pPr eaLnBrk="1" hangingPunct="1">
+              <a:defRPr>
+                <a:solidFill>
+                  <a:schemeClr val="tx2"/>
+                </a:solidFill>
+              </a:defRPr>
+            </a:lvl4pPr>
+            <a:lvl5pPr eaLnBrk="1" hangingPunct="1">
+              <a:defRPr>
+                <a:solidFill>
+                  <a:schemeClr val="tx2"/>
+                </a:solidFill>
+              </a:defRPr>
+            </a:lvl5pPr>
+            <a:lvl6pPr eaLnBrk="1" hangingPunct="1">
+              <a:defRPr>
+                <a:solidFill>
+                  <a:schemeClr val="tx2"/>
+                </a:solidFill>
+              </a:defRPr>
+            </a:lvl6pPr>
+            <a:lvl7pPr eaLnBrk="1" hangingPunct="1">
+              <a:defRPr>
+                <a:solidFill>
+                  <a:schemeClr val="tx2"/>
+                </a:solidFill>
+              </a:defRPr>
+            </a:lvl7pPr>
+            <a:lvl8pPr eaLnBrk="1" hangingPunct="1">
+              <a:defRPr>
+                <a:solidFill>
+                  <a:schemeClr val="tx2"/>
+                </a:solidFill>
+              </a:defRPr>
+            </a:lvl8pPr>
+            <a:lvl9pPr eaLnBrk="1" hangingPunct="1">
+              <a:defRPr>
+                <a:solidFill>
+                  <a:schemeClr val="tx2"/>
+                </a:solidFill>
+              </a:defRPr>
+            </a:lvl9pPr>
+          </a:lstStyle>
+          <a:p>
+            <a:r>
+              <a:rPr lang="en-US" sz="4400" dirty="0" smtClean="0">
+                <a:latin typeface="Arial Black" panose="020B0A04020102020204" pitchFamily="34" charset="0"/>
+              </a:rPr>
+              <a:t>Key Feature – </a:t>
+            </a:r>
+            <a:r>
+              <a:rPr lang="en-US" sz="4400" dirty="0" smtClean="0">
+                <a:solidFill>
+                  <a:schemeClr val="tx1"/>
+                </a:solidFill>
+                <a:latin typeface="Arial Black" panose="020B0A04020102020204" pitchFamily="34" charset="0"/>
+              </a:rPr>
+              <a:t>Generalized </a:t>
+            </a:r>
+            <a:endParaRPr lang="en-IN" sz="4400" dirty="0">
+              <a:solidFill>
+                <a:schemeClr val="tx1"/>
+              </a:solidFill>
+              <a:latin typeface="Arial Black" panose="020B0A04020102020204" pitchFamily="34" charset="0"/>
+            </a:endParaRPr>
+          </a:p>
+        </p:txBody>
+      </p:sp>
+    </p:spTree>
+    <p:extLst>
+      <p:ext uri="{BB962C8B-B14F-4D97-AF65-F5344CB8AC3E}">
+        <p14:creationId xmlns:p14="http://schemas.microsoft.com/office/powerpoint/2010/main" val="571291003"/>
+      </p:ext>
+    </p:extLst>
+  </p:cSld>
+  <p:clrMapOvr>
+    <a:masterClrMapping/>
+  </p:clrMapOvr>
+  <p:timing>
+    <p:tnLst>
+      <p:par>
+        <p:cTn id="1" dur="indefinite" restart="never" nodeType="tmRoot"/>
+      </p:par>
+    </p:tnLst>
+  </p:timing>
+</p:sld>
+</file>
+
+<file path=ppt/slides/slide5.xml><?xml version="1.0" encoding="utf-8"?>
+<p:sld xmlns:a="http://schemas.openxmlformats.org/drawingml/2006/main" xmlns:r="http://schemas.openxmlformats.org/officeDocument/2006/relationships" xmlns:p="http://schemas.openxmlformats.org/presentationml/2006/main">
+  <p:cSld>
+    <p:spTree>
+      <p:nvGrpSpPr>
+        <p:cNvPr id="1" name=""/>
+        <p:cNvGrpSpPr/>
+        <p:nvPr/>
+      </p:nvGrpSpPr>
+      <p:grpSpPr>
+        <a:xfrm>
+          <a:off x="0" y="0"/>
+          <a:ext cx="0" cy="0"/>
+          <a:chOff x="0" y="0"/>
+          <a:chExt cx="0" cy="0"/>
+        </a:xfrm>
+      </p:grpSpPr>
+      <p:sp>
+        <p:nvSpPr>
+          <p:cNvPr id="2" name="Title 1"/>
+          <p:cNvSpPr>
+            <a:spLocks noGrp="1"/>
+          </p:cNvSpPr>
+          <p:nvPr>
+            <p:ph type="title"/>
+          </p:nvPr>
+        </p:nvSpPr>
+        <p:spPr/>
+        <p:txBody>
+          <a:bodyPr>
+            <a:normAutofit/>
+          </a:bodyPr>
+          <a:lstStyle/>
+          <a:p>
+            <a:r>
+              <a:rPr lang="en-US" sz="5400" dirty="0" smtClean="0">
+                <a:latin typeface="Arial Black" panose="020B0A04020102020204" pitchFamily="34" charset="0"/>
+              </a:rPr>
+              <a:t>Disadvantages </a:t>
+            </a:r>
+            <a:endParaRPr lang="en-IN" sz="5400" dirty="0">
+              <a:latin typeface="Arial Black" panose="020B0A04020102020204" pitchFamily="34" charset="0"/>
+            </a:endParaRPr>
+          </a:p>
+        </p:txBody>
+      </p:sp>
+      <p:sp>
+        <p:nvSpPr>
+          <p:cNvPr id="3" name="Content Placeholder 2"/>
+          <p:cNvSpPr>
+            <a:spLocks noGrp="1"/>
+          </p:cNvSpPr>
+          <p:nvPr>
+            <p:ph idx="1"/>
+          </p:nvPr>
+        </p:nvSpPr>
+        <p:spPr/>
+        <p:txBody>
+          <a:bodyPr/>
+          <a:lstStyle/>
+          <a:p>
+            <a:r>
+              <a:rPr lang="en-US" sz="2400" dirty="0" smtClean="0"/>
+              <a:t>Accuracy </a:t>
+            </a:r>
+          </a:p>
+          <a:p>
+            <a:r>
+              <a:rPr lang="en-US" sz="2400" dirty="0" smtClean="0"/>
+              <a:t>As generalize predictive model it not consider other factors like </a:t>
+            </a:r>
+          </a:p>
+          <a:p>
+            <a:pPr marL="0" indent="0">
+              <a:buNone/>
+            </a:pPr>
+            <a:r>
+              <a:rPr lang="en-US" sz="2400" dirty="0" smtClean="0"/>
+              <a:t>-	Competitor </a:t>
+            </a:r>
+          </a:p>
+          <a:p>
+            <a:pPr marL="0" indent="0">
+              <a:buNone/>
+            </a:pPr>
+            <a:r>
+              <a:rPr lang="en-US" sz="2400" dirty="0" smtClean="0"/>
+              <a:t>-	Current Market Situation (Pandemic or other things)</a:t>
+            </a:r>
+          </a:p>
+          <a:p>
+            <a:r>
+              <a:rPr lang="en-US" sz="2400" dirty="0" smtClean="0"/>
+              <a:t>We can only get monthly prediction other option are not available </a:t>
+            </a:r>
+          </a:p>
+          <a:p>
+            <a:r>
+              <a:rPr lang="en-US" sz="2400" dirty="0" smtClean="0"/>
+              <a:t>Past Data Required (last 12 months sales)</a:t>
+            </a:r>
+            <a:r>
+              <a:rPr lang="en-US" dirty="0" smtClean="0"/>
+              <a:t> </a:t>
+            </a:r>
+            <a:endParaRPr lang="en-IN" dirty="0"/>
+          </a:p>
+        </p:txBody>
+      </p:sp>
+    </p:spTree>
+    <p:extLst>
+      <p:ext uri="{BB962C8B-B14F-4D97-AF65-F5344CB8AC3E}">
+        <p14:creationId xmlns:p14="http://schemas.microsoft.com/office/powerpoint/2010/main" val="1368254894"/>
+      </p:ext>
+    </p:extLst>
+  </p:cSld>
+  <p:clrMapOvr>
+    <a:masterClrMapping/>
+  </p:clrMapOvr>
+  <p:timing>
+    <p:tnLst>
+      <p:par>
+        <p:cTn id="1" dur="indefinite" restart="never" nodeType="tmRoot"/>
+      </p:par>
+    </p:tnLst>
+  </p:timing>
+</p:sld>
+</file>
+
+<file path=ppt/slides/slide6.xml><?xml version="1.0" encoding="utf-8"?>
+<p:sld xmlns:a="http://schemas.openxmlformats.org/drawingml/2006/main" xmlns:r="http://schemas.openxmlformats.org/officeDocument/2006/relationships" xmlns:p="http://schemas.openxmlformats.org/presentationml/2006/main">
+  <p:cSld>
+    <p:spTree>
+      <p:nvGrpSpPr>
+        <p:cNvPr id="1" name=""/>
+        <p:cNvGrpSpPr/>
+        <p:nvPr/>
+      </p:nvGrpSpPr>
+      <p:grpSpPr>
+        <a:xfrm>
+          <a:off x="0" y="0"/>
+          <a:ext cx="0" cy="0"/>
+          <a:chOff x="0" y="0"/>
+          <a:chExt cx="0" cy="0"/>
+        </a:xfrm>
+      </p:grpSpPr>
+      <p:sp>
+        <p:nvSpPr>
+          <p:cNvPr id="2" name="Title 1"/>
+          <p:cNvSpPr>
+            <a:spLocks noGrp="1"/>
+          </p:cNvSpPr>
+          <p:nvPr>
+            <p:ph type="title"/>
+          </p:nvPr>
+        </p:nvSpPr>
+        <p:spPr/>
+        <p:txBody>
+          <a:bodyPr/>
+          <a:lstStyle/>
+          <a:p>
+            <a:r>
+              <a:rPr lang="en-US" dirty="0" smtClean="0">
+                <a:latin typeface="Arial Black" panose="020B0A04020102020204" pitchFamily="34" charset="0"/>
+              </a:rPr>
+              <a:t>Technical Overview -</a:t>
+            </a:r>
+            <a:endParaRPr lang="en-IN" dirty="0">
+              <a:latin typeface="Arial Black" panose="020B0A04020102020204" pitchFamily="34" charset="0"/>
+            </a:endParaRPr>
+          </a:p>
+        </p:txBody>
+      </p:sp>
+      <p:sp>
+        <p:nvSpPr>
+          <p:cNvPr id="3" name="Title 1"/>
+          <p:cNvSpPr txBox="1">
+            <a:spLocks/>
+          </p:cNvSpPr>
+          <p:nvPr/>
+        </p:nvSpPr>
+        <p:spPr>
+          <a:xfrm>
+            <a:off x="807962" y="1643018"/>
+            <a:ext cx="8596668" cy="4640216"/>
+          </a:xfrm>
+          <a:prstGeom prst="rect">
+            <a:avLst/>
+          </a:prstGeom>
+        </p:spPr>
+        <p:txBody>
+          <a:bodyPr vert="horz" lIns="91440" tIns="45720" rIns="91440" bIns="45720" rtlCol="0" anchor="t">
+            <a:normAutofit/>
+          </a:bodyPr>
+          <a:lstStyle>
+            <a:lvl1pPr algn="l" defTabSz="457200" rtl="0" eaLnBrk="1" latinLnBrk="0" hangingPunct="1">
+              <a:spcBef>
+                <a:spcPct val="0"/>
+              </a:spcBef>
+              <a:buNone/>
+              <a:defRPr sz="3600" kern="1200">
+                <a:solidFill>
+                  <a:schemeClr val="accent1"/>
+                </a:solidFill>
+                <a:latin typeface="+mj-lt"/>
+                <a:ea typeface="+mj-ea"/>
+                <a:cs typeface="+mj-cs"/>
+              </a:defRPr>
+            </a:lvl1pPr>
+            <a:lvl2pPr eaLnBrk="1" hangingPunct="1">
+              <a:defRPr>
+                <a:solidFill>
+                  <a:schemeClr val="tx2"/>
+                </a:solidFill>
+              </a:defRPr>
+            </a:lvl2pPr>
+            <a:lvl3pPr eaLnBrk="1" hangingPunct="1">
+              <a:defRPr>
+                <a:solidFill>
+                  <a:schemeClr val="tx2"/>
+                </a:solidFill>
+              </a:defRPr>
+            </a:lvl3pPr>
+            <a:lvl4pPr eaLnBrk="1" hangingPunct="1">
+              <a:defRPr>
+                <a:solidFill>
+                  <a:schemeClr val="tx2"/>
+                </a:solidFill>
+              </a:defRPr>
+            </a:lvl4pPr>
+            <a:lvl5pPr eaLnBrk="1" hangingPunct="1">
+              <a:defRPr>
+                <a:solidFill>
+                  <a:schemeClr val="tx2"/>
+                </a:solidFill>
+              </a:defRPr>
+            </a:lvl5pPr>
+            <a:lvl6pPr eaLnBrk="1" hangingPunct="1">
+              <a:defRPr>
+                <a:solidFill>
+                  <a:schemeClr val="tx2"/>
+                </a:solidFill>
+              </a:defRPr>
+            </a:lvl6pPr>
+            <a:lvl7pPr eaLnBrk="1" hangingPunct="1">
+              <a:defRPr>
+                <a:solidFill>
+                  <a:schemeClr val="tx2"/>
+                </a:solidFill>
+              </a:defRPr>
+            </a:lvl7pPr>
+            <a:lvl8pPr eaLnBrk="1" hangingPunct="1">
+              <a:defRPr>
+                <a:solidFill>
+                  <a:schemeClr val="tx2"/>
+                </a:solidFill>
+              </a:defRPr>
+            </a:lvl8pPr>
+            <a:lvl9pPr eaLnBrk="1" hangingPunct="1">
+              <a:defRPr>
+                <a:solidFill>
+                  <a:schemeClr val="tx2"/>
+                </a:solidFill>
+              </a:defRPr>
+            </a:lvl9pPr>
+          </a:lstStyle>
+          <a:p>
+            <a:pPr marL="457200" indent="-457200">
+              <a:buFont typeface="Arial" panose="020B0604020202020204" pitchFamily="34" charset="0"/>
+              <a:buChar char="•"/>
+            </a:pPr>
+            <a:r>
+              <a:rPr lang="en-US" sz="2800" b="1" dirty="0" smtClean="0">
+                <a:solidFill>
+                  <a:schemeClr val="tx1"/>
+                </a:solidFill>
+                <a:latin typeface="Bahnschrift Light" panose="020B0502040204020203" pitchFamily="34" charset="0"/>
+                <a:cs typeface="Arial" panose="020B0604020202020204" pitchFamily="34" charset="0"/>
+              </a:rPr>
+              <a:t>Dataset – </a:t>
+            </a:r>
+          </a:p>
+          <a:p>
+            <a:r>
+              <a:rPr lang="en-US" sz="2800" dirty="0" smtClean="0">
+                <a:solidFill>
+                  <a:schemeClr val="bg1">
+                    <a:lumMod val="50000"/>
+                  </a:schemeClr>
+                </a:solidFill>
+                <a:latin typeface="Bahnschrift Light" panose="020B0502040204020203" pitchFamily="34" charset="0"/>
+                <a:cs typeface="Arial" panose="020B0604020202020204" pitchFamily="34" charset="0"/>
+              </a:rPr>
+              <a:t>We use data of 5 yeas</a:t>
+            </a:r>
+          </a:p>
+          <a:p>
+            <a:endParaRPr lang="en-US" sz="900" dirty="0" smtClean="0">
+              <a:solidFill>
+                <a:schemeClr val="bg1">
+                  <a:lumMod val="50000"/>
+                </a:schemeClr>
+              </a:solidFill>
+              <a:latin typeface="Bahnschrift Light" panose="020B0502040204020203" pitchFamily="34" charset="0"/>
+              <a:cs typeface="Arial" panose="020B0604020202020204" pitchFamily="34" charset="0"/>
+            </a:endParaRPr>
+          </a:p>
+          <a:p>
+            <a:pPr marL="457200" indent="-457200">
+              <a:buFont typeface="Arial" panose="020B0604020202020204" pitchFamily="34" charset="0"/>
+              <a:buChar char="•"/>
+            </a:pPr>
+            <a:r>
+              <a:rPr lang="en-US" sz="2800" b="1" dirty="0" smtClean="0">
+                <a:solidFill>
+                  <a:schemeClr val="tx1"/>
+                </a:solidFill>
+                <a:latin typeface="Bahnschrift Light" panose="020B0502040204020203" pitchFamily="34" charset="0"/>
+                <a:cs typeface="Arial" panose="020B0604020202020204" pitchFamily="34" charset="0"/>
+              </a:rPr>
+              <a:t>Used feature –</a:t>
+            </a:r>
+          </a:p>
+          <a:p>
+            <a:r>
+              <a:rPr lang="en-US" sz="2800" dirty="0" smtClean="0">
+                <a:solidFill>
+                  <a:schemeClr val="bg1">
+                    <a:lumMod val="50000"/>
+                  </a:schemeClr>
+                </a:solidFill>
+                <a:latin typeface="Bahnschrift Light" panose="020B0502040204020203" pitchFamily="34" charset="0"/>
+                <a:cs typeface="Arial" panose="020B0604020202020204" pitchFamily="34" charset="0"/>
+              </a:rPr>
+              <a:t>Sales and corresponding months</a:t>
+            </a:r>
+          </a:p>
+          <a:p>
+            <a:endParaRPr lang="en-US" sz="1100" dirty="0" smtClean="0">
+              <a:solidFill>
+                <a:schemeClr val="bg1">
+                  <a:lumMod val="50000"/>
+                </a:schemeClr>
+              </a:solidFill>
+              <a:latin typeface="Bahnschrift Light" panose="020B0502040204020203" pitchFamily="34" charset="0"/>
+              <a:cs typeface="Arial" panose="020B0604020202020204" pitchFamily="34" charset="0"/>
+            </a:endParaRPr>
+          </a:p>
+          <a:p>
+            <a:pPr marL="457200" indent="-457200">
+              <a:buFont typeface="Arial" panose="020B0604020202020204" pitchFamily="34" charset="0"/>
+              <a:buChar char="•"/>
+            </a:pPr>
+            <a:r>
+              <a:rPr lang="en-US" sz="2800" b="1" dirty="0" smtClean="0">
+                <a:solidFill>
+                  <a:schemeClr val="tx1"/>
+                </a:solidFill>
+                <a:latin typeface="Bahnschrift Light" panose="020B0502040204020203" pitchFamily="34" charset="0"/>
+                <a:cs typeface="Arial" panose="020B0604020202020204" pitchFamily="34" charset="0"/>
+              </a:rPr>
+              <a:t>Preprocessing</a:t>
+            </a:r>
+            <a:r>
+              <a:rPr lang="en-US" sz="2800" b="1" dirty="0">
+                <a:solidFill>
+                  <a:schemeClr val="bg1">
+                    <a:lumMod val="50000"/>
+                  </a:schemeClr>
+                </a:solidFill>
+                <a:latin typeface="Bahnschrift Light" panose="020B0502040204020203" pitchFamily="34" charset="0"/>
+                <a:cs typeface="Arial" panose="020B0604020202020204" pitchFamily="34" charset="0"/>
+              </a:rPr>
+              <a:t> </a:t>
+            </a:r>
+            <a:r>
+              <a:rPr lang="en-US" sz="2800" b="1" dirty="0" smtClean="0">
+                <a:solidFill>
+                  <a:schemeClr val="tx1"/>
+                </a:solidFill>
+                <a:latin typeface="Bahnschrift Light" panose="020B0502040204020203" pitchFamily="34" charset="0"/>
+                <a:cs typeface="Arial" panose="020B0604020202020204" pitchFamily="34" charset="0"/>
+              </a:rPr>
+              <a:t>–</a:t>
+            </a:r>
+          </a:p>
+          <a:p>
+            <a:r>
+              <a:rPr lang="en-US" sz="2800" dirty="0">
+                <a:solidFill>
+                  <a:schemeClr val="bg1">
+                    <a:lumMod val="50000"/>
+                  </a:schemeClr>
+                </a:solidFill>
+                <a:latin typeface="Bahnschrift Light" panose="020B0502040204020203" pitchFamily="34" charset="0"/>
+                <a:cs typeface="Arial" panose="020B0604020202020204" pitchFamily="34" charset="0"/>
+              </a:rPr>
+              <a:t>Used sales</a:t>
+            </a:r>
+            <a:r>
+              <a:rPr lang="en-US" sz="2800" dirty="0" smtClean="0">
+                <a:solidFill>
+                  <a:schemeClr val="tx1"/>
+                </a:solidFill>
+                <a:latin typeface="Bahnschrift Light" panose="020B0502040204020203" pitchFamily="34" charset="0"/>
+                <a:cs typeface="Arial" panose="020B0604020202020204" pitchFamily="34" charset="0"/>
+              </a:rPr>
+              <a:t> </a:t>
+            </a:r>
+            <a:r>
+              <a:rPr lang="en-US" sz="2800" dirty="0">
+                <a:solidFill>
+                  <a:schemeClr val="bg1">
+                    <a:lumMod val="50000"/>
+                  </a:schemeClr>
+                </a:solidFill>
+                <a:latin typeface="Bahnschrift Light" panose="020B0502040204020203" pitchFamily="34" charset="0"/>
+                <a:cs typeface="Arial" panose="020B0604020202020204" pitchFamily="34" charset="0"/>
+              </a:rPr>
+              <a:t>difference </a:t>
+            </a:r>
+            <a:endParaRPr lang="en-US" sz="2800" dirty="0" smtClean="0">
+              <a:solidFill>
+                <a:schemeClr val="bg1">
+                  <a:lumMod val="50000"/>
+                </a:schemeClr>
+              </a:solidFill>
+              <a:latin typeface="Bahnschrift Light" panose="020B0502040204020203" pitchFamily="34" charset="0"/>
+              <a:cs typeface="Arial" panose="020B0604020202020204" pitchFamily="34" charset="0"/>
+            </a:endParaRPr>
+          </a:p>
+          <a:p>
+            <a:endParaRPr lang="en-US" sz="1050" dirty="0">
+              <a:solidFill>
+                <a:schemeClr val="bg1">
+                  <a:lumMod val="50000"/>
+                </a:schemeClr>
+              </a:solidFill>
+              <a:latin typeface="Bahnschrift Light" panose="020B0502040204020203" pitchFamily="34" charset="0"/>
+              <a:cs typeface="Arial" panose="020B0604020202020204" pitchFamily="34" charset="0"/>
+            </a:endParaRPr>
+          </a:p>
+          <a:p>
+            <a:pPr marL="457200" indent="-457200">
+              <a:buFont typeface="Arial" panose="020B0604020202020204" pitchFamily="34" charset="0"/>
+              <a:buChar char="•"/>
+            </a:pPr>
+            <a:r>
+              <a:rPr lang="en-US" sz="2800" b="1" dirty="0">
+                <a:solidFill>
+                  <a:schemeClr val="tx1"/>
+                </a:solidFill>
+                <a:latin typeface="Bahnschrift Light" panose="020B0502040204020203" pitchFamily="34" charset="0"/>
+                <a:cs typeface="Arial" panose="020B0604020202020204" pitchFamily="34" charset="0"/>
+              </a:rPr>
+              <a:t>Training Type and Model </a:t>
+            </a:r>
+            <a:r>
+              <a:rPr lang="en-US" sz="2800" b="1" dirty="0" smtClean="0">
+                <a:solidFill>
+                  <a:schemeClr val="tx1"/>
+                </a:solidFill>
+                <a:latin typeface="Bahnschrift Light" panose="020B0502040204020203" pitchFamily="34" charset="0"/>
+                <a:cs typeface="Arial" panose="020B0604020202020204" pitchFamily="34" charset="0"/>
+              </a:rPr>
+              <a:t>Type –</a:t>
+            </a:r>
+          </a:p>
+          <a:p>
+            <a:r>
+              <a:rPr lang="en-US" sz="2800" dirty="0">
+                <a:solidFill>
+                  <a:schemeClr val="bg1">
+                    <a:lumMod val="50000"/>
+                  </a:schemeClr>
+                </a:solidFill>
+                <a:latin typeface="Bahnschrift Light" panose="020B0502040204020203" pitchFamily="34" charset="0"/>
+                <a:cs typeface="Arial" panose="020B0604020202020204" pitchFamily="34" charset="0"/>
+              </a:rPr>
+              <a:t>Used Supervised learning Method using linear regression to build generalize sales </a:t>
+            </a:r>
+            <a:r>
+              <a:rPr lang="en-US" sz="2800" dirty="0" smtClean="0">
+                <a:solidFill>
+                  <a:schemeClr val="bg1">
+                    <a:lumMod val="50000"/>
+                  </a:schemeClr>
+                </a:solidFill>
+                <a:latin typeface="Bahnschrift Light" panose="020B0502040204020203" pitchFamily="34" charset="0"/>
+                <a:cs typeface="Arial" panose="020B0604020202020204" pitchFamily="34" charset="0"/>
+              </a:rPr>
+              <a:t>forecasting </a:t>
+            </a:r>
+            <a:endParaRPr lang="en-US" sz="2800" dirty="0">
+              <a:solidFill>
+                <a:schemeClr val="bg1">
+                  <a:lumMod val="50000"/>
+                </a:schemeClr>
+              </a:solidFill>
+              <a:latin typeface="Bahnschrift Light" panose="020B0502040204020203" pitchFamily="34" charset="0"/>
+              <a:cs typeface="Arial" panose="020B0604020202020204" pitchFamily="34" charset="0"/>
+            </a:endParaRPr>
+          </a:p>
+        </p:txBody>
+      </p:sp>
+    </p:spTree>
+    <p:extLst>
+      <p:ext uri="{BB962C8B-B14F-4D97-AF65-F5344CB8AC3E}">
+        <p14:creationId xmlns:p14="http://schemas.microsoft.com/office/powerpoint/2010/main" val="1008119984"/>
+      </p:ext>
+    </p:extLst>
+  </p:cSld>
+  <p:clrMapOvr>
+    <a:masterClrMapping/>
+  </p:clrMapOvr>
+  <p:timing>
+    <p:tnLst>
+      <p:par>
+        <p:cTn id="1" dur="indefinite" restart="never" nodeType="tmRoot"/>
+      </p:par>
+    </p:tnLst>
+  </p:timing>
+</p:sld>
+</file>
+
+<file path=ppt/slides/slide7.xml><?xml version="1.0" encoding="utf-8"?>
 <p:sld xmlns:a="http://schemas.openxmlformats.org/drawingml/2006/main" xmlns:r="http://schemas.openxmlformats.org/officeDocument/2006/relationships" xmlns:p="http://schemas.openxmlformats.org/presentationml/2006/main">
   <p:cSld>
     <p:spTree>
@@ -6203,13 +7320,20 @@
   <p:clrMapOvr>
     <a:masterClrMapping/>
   </p:clrMapOvr>
+  <p:timing>
+    <p:tnLst>
+      <p:par>
+        <p:cTn id="1" dur="indefinite" restart="never" nodeType="tmRoot"/>
+      </p:par>
+    </p:tnLst>
+  </p:timing>
 </p:sld>
 </file>
 
 <file path=ppt/theme/theme1.xml><?xml version="1.0" encoding="utf-8"?>
 <a:theme xmlns:a="http://schemas.openxmlformats.org/drawingml/2006/main" name="Facet">
   <a:themeElements>
-    <a:clrScheme name="Red Violet">
+    <a:clrScheme name="Facet">
       <a:dk1>
         <a:sysClr val="windowText" lastClr="000000"/>
       </a:dk1>
@@ -6217,34 +7341,34 @@
         <a:sysClr val="window" lastClr="FFFFFF"/>
       </a:lt1>
       <a:dk2>
-        <a:srgbClr val="454551"/>
+        <a:srgbClr val="2C3C43"/>
       </a:dk2>
       <a:lt2>
-        <a:srgbClr val="D8D9DC"/>
+        <a:srgbClr val="EBEBEB"/>
       </a:lt2>
       <a:accent1>
-        <a:srgbClr val="E32D91"/>
+        <a:srgbClr val="5FCBEF"/>
       </a:accent1>
       <a:accent2>
-        <a:srgbClr val="C830CC"/>
+        <a:srgbClr val="2E83C3"/>
       </a:accent2>
       <a:accent3>
-        <a:srgbClr val="4EA6DC"/>
+        <a:srgbClr val="42D0A2"/>
       </a:accent3>
       <a:accent4>
-        <a:srgbClr val="4775E7"/>
+        <a:srgbClr val="2E946B"/>
       </a:accent4>
       <a:accent5>
-        <a:srgbClr val="8971E1"/>
+        <a:srgbClr val="42B051"/>
       </a:accent5>
       <a:accent6>
-        <a:srgbClr val="D54773"/>
+        <a:srgbClr val="96D141"/>
       </a:accent6>
       <a:hlink>
-        <a:srgbClr val="6B9F25"/>
+        <a:srgbClr val="3FCDE7"/>
       </a:hlink>
       <a:folHlink>
-        <a:srgbClr val="8C8C8C"/>
+        <a:srgbClr val="A9D3E1"/>
       </a:folHlink>
     </a:clrScheme>
     <a:fontScheme name="Facet">
@@ -6319,7 +7443,7 @@
         <a:font script="Geor" typeface="Sylfaen"/>
       </a:minorFont>
     </a:fontScheme>
-    <a:fmtScheme name="Facet">
+    <a:fmtScheme name="Office">
       <a:fillStyleLst>
         <a:solidFill>
           <a:schemeClr val="phClr"/>
@@ -6328,13 +7452,23 @@
           <a:gsLst>
             <a:gs pos="0">
               <a:schemeClr val="phClr">
-                <a:tint val="65000"/>
                 <a:lumMod val="110000"/>
+                <a:satMod val="105000"/>
+                <a:tint val="67000"/>
               </a:schemeClr>
             </a:gs>
-            <a:gs pos="88000">
+            <a:gs pos="50000">
               <a:schemeClr val="phClr">
-                <a:tint val="90000"/>
+                <a:lumMod val="105000"/>
+                <a:satMod val="103000"/>
+                <a:tint val="73000"/>
+              </a:schemeClr>
+            </a:gs>
+            <a:gs pos="100000">
+              <a:schemeClr val="phClr">
+                <a:lumMod val="105000"/>
+                <a:satMod val="109000"/>
+                <a:tint val="81000"/>
               </a:schemeClr>
             </a:gs>
           </a:gsLst>
@@ -6344,14 +7478,23 @@
           <a:gsLst>
             <a:gs pos="0">
               <a:schemeClr val="phClr">
-                <a:tint val="96000"/>
-                <a:lumMod val="100000"/>
+                <a:satMod val="103000"/>
+                <a:lumMod val="102000"/>
+                <a:tint val="94000"/>
               </a:schemeClr>
             </a:gs>
-            <a:gs pos="78000">
+            <a:gs pos="50000">
               <a:schemeClr val="phClr">
-                <a:shade val="94000"/>
-                <a:lumMod val="94000"/>
+                <a:satMod val="110000"/>
+                <a:lumMod val="100000"/>
+                <a:shade val="100000"/>
+              </a:schemeClr>
+            </a:gs>
+            <a:gs pos="100000">
+              <a:schemeClr val="phClr">
+                <a:lumMod val="99000"/>
+                <a:satMod val="120000"/>
+                <a:shade val="78000"/>
               </a:schemeClr>
             </a:gs>
           </a:gsLst>
@@ -6359,23 +7502,26 @@
         </a:gradFill>
       </a:fillStyleLst>
       <a:lnStyleLst>
-        <a:ln w="12700" cap="rnd" cmpd="sng" algn="ctr">
+        <a:ln w="6350" cap="flat" cmpd="sng" algn="ctr">
           <a:solidFill>
             <a:schemeClr val="phClr"/>
           </a:solidFill>
           <a:prstDash val="solid"/>
+          <a:miter lim="800000"/>
         </a:ln>
-        <a:ln w="19050" cap="rnd" cmpd="sng" algn="ctr">
+        <a:ln w="12700" cap="flat" cmpd="sng" algn="ctr">
           <a:solidFill>
             <a:schemeClr val="phClr"/>
           </a:solidFill>
           <a:prstDash val="solid"/>
+          <a:miter lim="800000"/>
         </a:ln>
-        <a:ln w="25400" cap="rnd" cmpd="sng" algn="ctr">
+        <a:ln w="19050" cap="flat" cmpd="sng" algn="ctr">
           <a:solidFill>
             <a:schemeClr val="phClr"/>
           </a:solidFill>
           <a:prstDash val="solid"/>
+          <a:miter lim="800000"/>
         </a:ln>
       </a:lnStyleLst>
       <a:effectStyleLst>
@@ -6383,31 +7529,16 @@
           <a:effectLst/>
         </a:effectStyle>
         <a:effectStyle>
+          <a:effectLst/>
+        </a:effectStyle>
+        <a:effectStyle>
           <a:effectLst>
-            <a:outerShdw blurRad="38100" dist="25400" dir="5400000" rotWithShape="0">
+            <a:outerShdw blurRad="57150" dist="19050" dir="5400000" algn="ctr" rotWithShape="0">
               <a:srgbClr val="000000">
-                <a:alpha val="35000"/>
+                <a:alpha val="63000"/>
               </a:srgbClr>
             </a:outerShdw>
           </a:effectLst>
-        </a:effectStyle>
-        <a:effectStyle>
-          <a:effectLst>
-            <a:outerShdw blurRad="50800" dist="38100" dir="5400000" rotWithShape="0">
-              <a:srgbClr val="000000">
-                <a:alpha val="35000"/>
-              </a:srgbClr>
-            </a:outerShdw>
-          </a:effectLst>
-          <a:scene3d>
-            <a:camera prst="orthographicFront">
-              <a:rot lat="0" lon="0" rev="0"/>
-            </a:camera>
-            <a:lightRig rig="threePt" dir="tl"/>
-          </a:scene3d>
-          <a:sp3d prstMaterial="plastic">
-            <a:bevelT w="0" h="0"/>
-          </a:sp3d>
         </a:effectStyle>
       </a:effectStyleLst>
       <a:bgFillStyleLst>
@@ -6457,7 +7588,7 @@
   <a:extraClrSchemeLst/>
   <a:extLst>
     <a:ext uri="{05A4C25C-085E-4340-85A3-A5531E510DB2}">
-      <thm15:themeFamily xmlns:thm15="http://schemas.microsoft.com/office/thememl/2012/main" name="Facet" id="{C0C680CD-088A-49FC-A102-D699147F32B2}" vid="{CFBC31BA-B70F-4F30-BCAA-4F3011E16C4D}"/>
+      <thm15:themeFamily xmlns:thm15="http://schemas.microsoft.com/office/thememl/2012/main" name="Facet" id="{C0C680CD-088A-49FC-A102-D699147F32B2}" vid="{0B5AB586-D108-4FC1-8368-649FE654B894}"/>
     </a:ext>
   </a:extLst>
 </a:theme>

</xml_diff>